<commit_message>
doc imporved to show wordhits and wordhitChunks are belong to wordHitsgroup
</commit_message>
<xml_diff>
--- a/doc/Olego_SA.pptx
+++ b/doc/Olego_SA.pptx
@@ -206,7 +206,7 @@
           <a:p>
             <a:fld id="{2A9421B4-94D4-F648-858F-61EAD0B14ECA}" type="datetimeFigureOut">
               <a:rPr lang="en-US" smtClean="0"/>
-              <a:t>6/15/16</a:t>
+              <a:t>7/20/16</a:t>
             </a:fld>
             <a:endParaRPr lang="en-US"/>
           </a:p>
@@ -1054,7 +1054,7 @@
           <a:p>
             <a:fld id="{1E9BC6DA-07B3-C146-9857-19446BE8652F}" type="datetimeFigureOut">
               <a:rPr lang="en-US" smtClean="0"/>
-              <a:t>6/15/16</a:t>
+              <a:t>7/20/16</a:t>
             </a:fld>
             <a:endParaRPr lang="en-US"/>
           </a:p>
@@ -1229,7 +1229,7 @@
           <a:p>
             <a:fld id="{1E9BC6DA-07B3-C146-9857-19446BE8652F}" type="datetimeFigureOut">
               <a:rPr lang="en-US" smtClean="0"/>
-              <a:t>6/15/16</a:t>
+              <a:t>7/20/16</a:t>
             </a:fld>
             <a:endParaRPr lang="en-US"/>
           </a:p>
@@ -1409,7 +1409,7 @@
           <a:p>
             <a:fld id="{1E9BC6DA-07B3-C146-9857-19446BE8652F}" type="datetimeFigureOut">
               <a:rPr lang="en-US" smtClean="0"/>
-              <a:t>6/15/16</a:t>
+              <a:t>7/20/16</a:t>
             </a:fld>
             <a:endParaRPr lang="en-US"/>
           </a:p>
@@ -1584,7 +1584,7 @@
           <a:p>
             <a:fld id="{1E9BC6DA-07B3-C146-9857-19446BE8652F}" type="datetimeFigureOut">
               <a:rPr lang="en-US" smtClean="0"/>
-              <a:t>6/15/16</a:t>
+              <a:t>7/20/16</a:t>
             </a:fld>
             <a:endParaRPr lang="en-US"/>
           </a:p>
@@ -1828,7 +1828,7 @@
           <a:p>
             <a:fld id="{1E9BC6DA-07B3-C146-9857-19446BE8652F}" type="datetimeFigureOut">
               <a:rPr lang="en-US" smtClean="0"/>
-              <a:t>6/15/16</a:t>
+              <a:t>7/20/16</a:t>
             </a:fld>
             <a:endParaRPr lang="en-US"/>
           </a:p>
@@ -2065,7 +2065,7 @@
           <a:p>
             <a:fld id="{1E9BC6DA-07B3-C146-9857-19446BE8652F}" type="datetimeFigureOut">
               <a:rPr lang="en-US" smtClean="0"/>
-              <a:t>6/15/16</a:t>
+              <a:t>7/20/16</a:t>
             </a:fld>
             <a:endParaRPr lang="en-US"/>
           </a:p>
@@ -2437,7 +2437,7 @@
           <a:p>
             <a:fld id="{1E9BC6DA-07B3-C146-9857-19446BE8652F}" type="datetimeFigureOut">
               <a:rPr lang="en-US" smtClean="0"/>
-              <a:t>6/15/16</a:t>
+              <a:t>7/20/16</a:t>
             </a:fld>
             <a:endParaRPr lang="en-US"/>
           </a:p>
@@ -2560,7 +2560,7 @@
           <a:p>
             <a:fld id="{1E9BC6DA-07B3-C146-9857-19446BE8652F}" type="datetimeFigureOut">
               <a:rPr lang="en-US" smtClean="0"/>
-              <a:t>6/15/16</a:t>
+              <a:t>7/20/16</a:t>
             </a:fld>
             <a:endParaRPr lang="en-US"/>
           </a:p>
@@ -2655,7 +2655,7 @@
           <a:p>
             <a:fld id="{1E9BC6DA-07B3-C146-9857-19446BE8652F}" type="datetimeFigureOut">
               <a:rPr lang="en-US" smtClean="0"/>
-              <a:t>6/15/16</a:t>
+              <a:t>7/20/16</a:t>
             </a:fld>
             <a:endParaRPr lang="en-US"/>
           </a:p>
@@ -2937,7 +2937,7 @@
           <a:p>
             <a:fld id="{1E9BC6DA-07B3-C146-9857-19446BE8652F}" type="datetimeFigureOut">
               <a:rPr lang="en-US" smtClean="0"/>
-              <a:t>6/15/16</a:t>
+              <a:t>7/20/16</a:t>
             </a:fld>
             <a:endParaRPr lang="en-US"/>
           </a:p>
@@ -3199,7 +3199,7 @@
           <a:p>
             <a:fld id="{1E9BC6DA-07B3-C146-9857-19446BE8652F}" type="datetimeFigureOut">
               <a:rPr lang="en-US" smtClean="0"/>
-              <a:t>6/15/16</a:t>
+              <a:t>7/20/16</a:t>
             </a:fld>
             <a:endParaRPr lang="en-US"/>
           </a:p>
@@ -3412,7 +3412,7 @@
           <a:p>
             <a:fld id="{1E9BC6DA-07B3-C146-9857-19446BE8652F}" type="datetimeFigureOut">
               <a:rPr lang="en-US" smtClean="0"/>
-              <a:t>6/15/16</a:t>
+              <a:t>7/20/16</a:t>
             </a:fld>
             <a:endParaRPr lang="en-US"/>
           </a:p>
@@ -3931,7 +3931,7 @@
         <p:spPr>
           <a:xfrm>
             <a:off x="1311981" y="2452255"/>
-            <a:ext cx="6720340" cy="438195"/>
+            <a:ext cx="6720340" cy="453779"/>
           </a:xfrm>
           <a:prstGeom prst="rect">
             <a:avLst/>
@@ -4042,6 +4042,12 @@
           <a:prstGeom prst="rect">
             <a:avLst/>
           </a:prstGeom>
+          <a:solidFill>
+            <a:schemeClr val="accent4">
+              <a:lumMod val="40000"/>
+              <a:lumOff val="60000"/>
+            </a:schemeClr>
+          </a:solidFill>
         </p:spPr>
         <p:style>
           <a:lnRef idx="2">
@@ -4065,18 +4071,34 @@
           <a:p>
             <a:pPr algn="ctr"/>
             <a:r>
-              <a:rPr lang="en-US" altLang="zh-CN" sz="1350" dirty="0" err="1" smtClean="0"/>
+              <a:rPr lang="en-US" altLang="zh-CN" sz="1350" dirty="0" err="1" smtClean="0">
+                <a:solidFill>
+                  <a:schemeClr val="tx1"/>
+                </a:solidFill>
+              </a:rPr>
               <a:t>WordhitsChunk</a:t>
             </a:r>
             <a:r>
-              <a:rPr lang="zh-CN" altLang="en-US" sz="1350" dirty="0" smtClean="0"/>
+              <a:rPr lang="zh-CN" altLang="en-US" sz="1350" dirty="0" smtClean="0">
+                <a:solidFill>
+                  <a:schemeClr val="tx1"/>
+                </a:solidFill>
+              </a:rPr>
               <a:t> </a:t>
             </a:r>
             <a:r>
-              <a:rPr lang="en-US" sz="1350" dirty="0" smtClean="0"/>
+              <a:rPr lang="en-US" sz="1350" dirty="0" smtClean="0">
+                <a:solidFill>
+                  <a:schemeClr val="tx1"/>
+                </a:solidFill>
+              </a:rPr>
               <a:t>1</a:t>
             </a:r>
-            <a:endParaRPr lang="en-US" sz="1350" dirty="0"/>
+            <a:endParaRPr lang="en-US" sz="1350" dirty="0">
+              <a:solidFill>
+                <a:schemeClr val="tx1"/>
+              </a:solidFill>
+            </a:endParaRPr>
           </a:p>
         </p:txBody>
       </p:sp>
@@ -4094,6 +4116,12 @@
           <a:prstGeom prst="rect">
             <a:avLst/>
           </a:prstGeom>
+          <a:solidFill>
+            <a:schemeClr val="accent4">
+              <a:lumMod val="40000"/>
+              <a:lumOff val="60000"/>
+            </a:schemeClr>
+          </a:solidFill>
         </p:spPr>
         <p:style>
           <a:lnRef idx="2">
@@ -4117,18 +4145,34 @@
           <a:p>
             <a:pPr algn="ctr"/>
             <a:r>
-              <a:rPr lang="en-US" altLang="zh-CN" sz="1350" smtClean="0"/>
+              <a:rPr lang="en-US" altLang="zh-CN" sz="1350" dirty="0" err="1" smtClean="0">
+                <a:solidFill>
+                  <a:schemeClr val="tx1"/>
+                </a:solidFill>
+              </a:rPr>
               <a:t>WordhitsChunk</a:t>
             </a:r>
             <a:r>
-              <a:rPr lang="zh-CN" altLang="en-US" sz="1350" dirty="0" smtClean="0"/>
+              <a:rPr lang="zh-CN" altLang="en-US" sz="1350" dirty="0" smtClean="0">
+                <a:solidFill>
+                  <a:schemeClr val="tx1"/>
+                </a:solidFill>
+              </a:rPr>
               <a:t> </a:t>
             </a:r>
             <a:r>
-              <a:rPr lang="en-US" sz="1350" dirty="0" smtClean="0"/>
+              <a:rPr lang="en-US" sz="1350" dirty="0" smtClean="0">
+                <a:solidFill>
+                  <a:schemeClr val="tx1"/>
+                </a:solidFill>
+              </a:rPr>
               <a:t>2</a:t>
             </a:r>
-            <a:endParaRPr lang="en-US" sz="1350" dirty="0"/>
+            <a:endParaRPr lang="en-US" sz="1350" dirty="0">
+              <a:solidFill>
+                <a:schemeClr val="tx1"/>
+              </a:solidFill>
+            </a:endParaRPr>
           </a:p>
         </p:txBody>
       </p:sp>
@@ -4700,6 +4744,12 @@
           <a:prstGeom prst="rect">
             <a:avLst/>
           </a:prstGeom>
+          <a:solidFill>
+            <a:schemeClr val="accent4">
+              <a:lumMod val="40000"/>
+              <a:lumOff val="60000"/>
+            </a:schemeClr>
+          </a:solidFill>
         </p:spPr>
         <p:style>
           <a:lnRef idx="2">
@@ -4723,18 +4773,34 @@
           <a:p>
             <a:pPr algn="ctr"/>
             <a:r>
-              <a:rPr lang="en-US" altLang="zh-CN" sz="1350" dirty="0" err="1" smtClean="0"/>
+              <a:rPr lang="en-US" altLang="zh-CN" sz="1350" dirty="0" err="1" smtClean="0">
+                <a:solidFill>
+                  <a:schemeClr val="tx1"/>
+                </a:solidFill>
+              </a:rPr>
               <a:t>WordhitsChunk</a:t>
             </a:r>
             <a:r>
-              <a:rPr lang="zh-CN" altLang="en-US" sz="1350" dirty="0" smtClean="0"/>
+              <a:rPr lang="zh-CN" altLang="en-US" sz="1350" dirty="0" smtClean="0">
+                <a:solidFill>
+                  <a:schemeClr val="tx1"/>
+                </a:solidFill>
+              </a:rPr>
               <a:t> </a:t>
             </a:r>
             <a:r>
-              <a:rPr lang="en-US" sz="1350" dirty="0" smtClean="0"/>
+              <a:rPr lang="en-US" sz="1350" dirty="0" smtClean="0">
+                <a:solidFill>
+                  <a:schemeClr val="tx1"/>
+                </a:solidFill>
+              </a:rPr>
               <a:t>1</a:t>
             </a:r>
-            <a:endParaRPr lang="en-US" sz="1350" dirty="0"/>
+            <a:endParaRPr lang="en-US" sz="1350" dirty="0">
+              <a:solidFill>
+                <a:schemeClr val="tx1"/>
+              </a:solidFill>
+            </a:endParaRPr>
           </a:p>
         </p:txBody>
       </p:sp>
@@ -4752,6 +4818,12 @@
           <a:prstGeom prst="rect">
             <a:avLst/>
           </a:prstGeom>
+          <a:solidFill>
+            <a:schemeClr val="accent4">
+              <a:lumMod val="40000"/>
+              <a:lumOff val="60000"/>
+            </a:schemeClr>
+          </a:solidFill>
         </p:spPr>
         <p:style>
           <a:lnRef idx="2">
@@ -4775,18 +4847,34 @@
           <a:p>
             <a:pPr algn="ctr"/>
             <a:r>
-              <a:rPr lang="en-US" altLang="zh-CN" sz="1350" smtClean="0"/>
+              <a:rPr lang="en-US" altLang="zh-CN" sz="1350" dirty="0" err="1" smtClean="0">
+                <a:solidFill>
+                  <a:schemeClr val="tx1"/>
+                </a:solidFill>
+              </a:rPr>
               <a:t>WordhitsChunk</a:t>
             </a:r>
             <a:r>
-              <a:rPr lang="zh-CN" altLang="en-US" sz="1350" dirty="0" smtClean="0"/>
+              <a:rPr lang="zh-CN" altLang="en-US" sz="1350" dirty="0" smtClean="0">
+                <a:solidFill>
+                  <a:schemeClr val="tx1"/>
+                </a:solidFill>
+              </a:rPr>
               <a:t> </a:t>
             </a:r>
             <a:r>
-              <a:rPr lang="en-US" sz="1350" dirty="0" smtClean="0"/>
+              <a:rPr lang="en-US" sz="1350" dirty="0" smtClean="0">
+                <a:solidFill>
+                  <a:schemeClr val="tx1"/>
+                </a:solidFill>
+              </a:rPr>
               <a:t>2</a:t>
             </a:r>
-            <a:endParaRPr lang="en-US" sz="1350" dirty="0"/>
+            <a:endParaRPr lang="en-US" sz="1350" dirty="0">
+              <a:solidFill>
+                <a:schemeClr val="tx1"/>
+              </a:solidFill>
+            </a:endParaRPr>
           </a:p>
         </p:txBody>
       </p:sp>
@@ -6643,11 +6731,7 @@
           <a:p>
             <a:r>
               <a:rPr lang="en-US" altLang="zh-CN" sz="1200" dirty="0" smtClean="0"/>
-              <a:t>w</a:t>
-            </a:r>
-            <a:r>
-              <a:rPr lang="en-US" altLang="zh-CN" sz="1200" dirty="0" smtClean="0"/>
-              <a:t>ord_2</a:t>
+              <a:t>word_2</a:t>
             </a:r>
             <a:endParaRPr lang="en-US" altLang="zh-CN" sz="1200" dirty="0"/>
           </a:p>
@@ -8195,6 +8279,96 @@
       </p:sp>
       <p:sp>
         <p:nvSpPr>
+          <p:cNvPr id="23" name="Rectangle 22"/>
+          <p:cNvSpPr/>
+          <p:nvPr/>
+        </p:nvSpPr>
+        <p:spPr>
+          <a:xfrm>
+            <a:off x="1447951" y="1506347"/>
+            <a:ext cx="2184248" cy="237930"/>
+          </a:xfrm>
+          <a:prstGeom prst="rect">
+            <a:avLst/>
+          </a:prstGeom>
+          <a:solidFill>
+            <a:schemeClr val="bg2">
+              <a:lumMod val="75000"/>
+            </a:schemeClr>
+          </a:solidFill>
+        </p:spPr>
+        <p:style>
+          <a:lnRef idx="2">
+            <a:schemeClr val="accent2">
+              <a:shade val="50000"/>
+            </a:schemeClr>
+          </a:lnRef>
+          <a:fillRef idx="1">
+            <a:schemeClr val="accent2"/>
+          </a:fillRef>
+          <a:effectRef idx="0">
+            <a:schemeClr val="accent2"/>
+          </a:effectRef>
+          <a:fontRef idx="minor">
+            <a:schemeClr val="lt1"/>
+          </a:fontRef>
+        </p:style>
+        <p:txBody>
+          <a:bodyPr rtlCol="0" anchor="ctr"/>
+          <a:lstStyle/>
+          <a:p>
+            <a:pPr algn="ctr"/>
+            <a:endParaRPr lang="en-US" sz="1350"/>
+          </a:p>
+        </p:txBody>
+      </p:sp>
+      <p:sp>
+        <p:nvSpPr>
+          <p:cNvPr id="25" name="Rectangle 24"/>
+          <p:cNvSpPr/>
+          <p:nvPr/>
+        </p:nvSpPr>
+        <p:spPr>
+          <a:xfrm>
+            <a:off x="1372107" y="2886452"/>
+            <a:ext cx="2189522" cy="237930"/>
+          </a:xfrm>
+          <a:prstGeom prst="rect">
+            <a:avLst/>
+          </a:prstGeom>
+          <a:solidFill>
+            <a:schemeClr val="bg2">
+              <a:lumMod val="75000"/>
+            </a:schemeClr>
+          </a:solidFill>
+        </p:spPr>
+        <p:style>
+          <a:lnRef idx="2">
+            <a:schemeClr val="accent2">
+              <a:shade val="50000"/>
+            </a:schemeClr>
+          </a:lnRef>
+          <a:fillRef idx="1">
+            <a:schemeClr val="accent2"/>
+          </a:fillRef>
+          <a:effectRef idx="0">
+            <a:schemeClr val="accent2"/>
+          </a:effectRef>
+          <a:fontRef idx="minor">
+            <a:schemeClr val="lt1"/>
+          </a:fontRef>
+        </p:style>
+        <p:txBody>
+          <a:bodyPr rtlCol="0" anchor="ctr"/>
+          <a:lstStyle/>
+          <a:p>
+            <a:pPr algn="ctr"/>
+            <a:endParaRPr lang="en-US" sz="1350"/>
+          </a:p>
+        </p:txBody>
+      </p:sp>
+      <p:sp>
+        <p:nvSpPr>
           <p:cNvPr id="47" name="TextBox 46"/>
           <p:cNvSpPr txBox="1"/>
           <p:nvPr/>
@@ -8342,7 +8516,7 @@
           <a:p>
             <a:pPr algn="ctr"/>
             <a:r>
-              <a:rPr lang="en-US" sz="1350" smtClean="0"/>
+              <a:rPr lang="en-US" sz="1350" dirty="0" smtClean="0"/>
               <a:t>wordhit_2</a:t>
             </a:r>
             <a:endParaRPr lang="en-US" sz="1350" dirty="0"/>
@@ -8554,46 +8728,6 @@
       </p:sp>
       <p:sp>
         <p:nvSpPr>
-          <p:cNvPr id="16" name="Rectangle 15"/>
-          <p:cNvSpPr/>
-          <p:nvPr/>
-        </p:nvSpPr>
-        <p:spPr>
-          <a:xfrm>
-            <a:off x="1419477" y="2887215"/>
-            <a:ext cx="1946831" cy="237744"/>
-          </a:xfrm>
-          <a:prstGeom prst="rect">
-            <a:avLst/>
-          </a:prstGeom>
-        </p:spPr>
-        <p:style>
-          <a:lnRef idx="2">
-            <a:schemeClr val="accent2">
-              <a:shade val="50000"/>
-            </a:schemeClr>
-          </a:lnRef>
-          <a:fillRef idx="1">
-            <a:schemeClr val="accent2"/>
-          </a:fillRef>
-          <a:effectRef idx="0">
-            <a:schemeClr val="accent2"/>
-          </a:effectRef>
-          <a:fontRef idx="minor">
-            <a:schemeClr val="lt1"/>
-          </a:fontRef>
-        </p:style>
-        <p:txBody>
-          <a:bodyPr rtlCol="0" anchor="ctr"/>
-          <a:lstStyle/>
-          <a:p>
-            <a:pPr algn="ctr"/>
-            <a:endParaRPr lang="en-US" sz="1350"/>
-          </a:p>
-        </p:txBody>
-      </p:sp>
-      <p:sp>
-        <p:nvSpPr>
           <p:cNvPr id="17" name="Rectangle 16"/>
           <p:cNvSpPr/>
           <p:nvPr/>
@@ -8673,7 +8807,7 @@
           <a:p>
             <a:pPr algn="ctr"/>
             <a:r>
-              <a:rPr lang="en-US" sz="1350" smtClean="0"/>
+              <a:rPr lang="en-US" sz="1350" dirty="0" smtClean="0"/>
               <a:t>wordhit_2</a:t>
             </a:r>
             <a:endParaRPr lang="en-US" sz="1350" dirty="0"/>
@@ -8746,11 +8880,7 @@
             </a:r>
             <a:r>
               <a:rPr lang="en-US" dirty="0" err="1" smtClean="0"/>
-              <a:t>W</a:t>
-            </a:r>
-            <a:r>
-              <a:rPr lang="en-US" dirty="0" err="1" smtClean="0"/>
-              <a:t>ordHits</a:t>
+              <a:t>WordHits</a:t>
             </a:r>
             <a:r>
               <a:rPr lang="en-US" dirty="0" smtClean="0"/>
@@ -8821,11 +8951,7 @@
             </a:r>
             <a:r>
               <a:rPr lang="en-US" sz="1500" dirty="0" err="1" smtClean="0"/>
-              <a:t>W</a:t>
-            </a:r>
-            <a:r>
-              <a:rPr lang="en-US" sz="1500" dirty="0" err="1" smtClean="0"/>
-              <a:t>ordHits</a:t>
+              <a:t>WordHits</a:t>
             </a:r>
             <a:endParaRPr lang="en-US" sz="1500" dirty="0" smtClean="0"/>
           </a:p>
@@ -9162,6 +9288,9 @@
           <a:prstGeom prst="rect">
             <a:avLst/>
           </a:prstGeom>
+          <a:solidFill>
+            <a:schemeClr val="accent3"/>
+          </a:solidFill>
         </p:spPr>
         <p:style>
           <a:lnRef idx="3">
@@ -9194,8 +9323,8 @@
         </p:nvSpPr>
         <p:spPr>
           <a:xfrm>
-            <a:off x="1368407" y="2090504"/>
-            <a:ext cx="546030" cy="239084"/>
+            <a:off x="1368407" y="2100732"/>
+            <a:ext cx="546030" cy="228855"/>
           </a:xfrm>
           <a:prstGeom prst="rect">
             <a:avLst/>
@@ -9234,8 +9363,8 @@
         </p:nvSpPr>
         <p:spPr>
           <a:xfrm>
-            <a:off x="2470350" y="2089164"/>
-            <a:ext cx="546030" cy="239084"/>
+            <a:off x="2470350" y="2102670"/>
+            <a:ext cx="546030" cy="225577"/>
           </a:xfrm>
           <a:prstGeom prst="rect">
             <a:avLst/>
@@ -9312,8 +9441,8 @@
         </p:nvSpPr>
         <p:spPr>
           <a:xfrm>
-            <a:off x="1967784" y="2089164"/>
-            <a:ext cx="448649" cy="239084"/>
+            <a:off x="1967784" y="2100732"/>
+            <a:ext cx="448649" cy="227515"/>
           </a:xfrm>
           <a:prstGeom prst="rect">
             <a:avLst/>
@@ -10254,46 +10383,6 @@
       </p:sp>
       <p:sp>
         <p:nvSpPr>
-          <p:cNvPr id="42" name="Rectangle 41"/>
-          <p:cNvSpPr/>
-          <p:nvPr/>
-        </p:nvSpPr>
-        <p:spPr>
-          <a:xfrm>
-            <a:off x="1390529" y="4052899"/>
-            <a:ext cx="1330380" cy="237744"/>
-          </a:xfrm>
-          <a:prstGeom prst="rect">
-            <a:avLst/>
-          </a:prstGeom>
-        </p:spPr>
-        <p:style>
-          <a:lnRef idx="2">
-            <a:schemeClr val="dk1">
-              <a:shade val="50000"/>
-            </a:schemeClr>
-          </a:lnRef>
-          <a:fillRef idx="1">
-            <a:schemeClr val="dk1"/>
-          </a:fillRef>
-          <a:effectRef idx="0">
-            <a:schemeClr val="dk1"/>
-          </a:effectRef>
-          <a:fontRef idx="minor">
-            <a:schemeClr val="lt1"/>
-          </a:fontRef>
-        </p:style>
-        <p:txBody>
-          <a:bodyPr rtlCol="0" anchor="ctr"/>
-          <a:lstStyle/>
-          <a:p>
-            <a:pPr algn="ctr"/>
-            <a:endParaRPr lang="en-US" sz="1350"/>
-          </a:p>
-        </p:txBody>
-      </p:sp>
-      <p:sp>
-        <p:nvSpPr>
           <p:cNvPr id="43" name="Rectangle 42"/>
           <p:cNvSpPr/>
           <p:nvPr/>
@@ -10456,7 +10545,7 @@
         </p:nvSpPr>
         <p:spPr>
           <a:xfrm rot="16200000">
-            <a:off x="2409468" y="4104945"/>
+            <a:off x="2403749" y="4119154"/>
             <a:ext cx="79412" cy="537152"/>
           </a:xfrm>
           <a:prstGeom prst="leftBrace">
@@ -10494,8 +10583,8 @@
         </p:nvSpPr>
         <p:spPr>
           <a:xfrm>
-            <a:off x="1325520" y="4358322"/>
-            <a:ext cx="722698" cy="300082"/>
+            <a:off x="1384665" y="4358322"/>
+            <a:ext cx="548548" cy="300082"/>
           </a:xfrm>
           <a:prstGeom prst="rect">
             <a:avLst/>
@@ -10509,9 +10598,14 @@
           <a:lstStyle/>
           <a:p>
             <a:r>
-              <a:rPr lang="en-US" sz="1350" dirty="0"/>
-              <a:t>word_3</a:t>
-            </a:r>
+              <a:rPr lang="en-US" altLang="zh-CN" sz="1350" smtClean="0"/>
+              <a:t>hit</a:t>
+            </a:r>
+            <a:r>
+              <a:rPr lang="en-US" sz="1350" smtClean="0"/>
+              <a:t>_3</a:t>
+            </a:r>
+            <a:endParaRPr lang="en-US" sz="1350" dirty="0"/>
           </a:p>
         </p:txBody>
       </p:sp>
@@ -10523,8 +10617,8 @@
         </p:nvSpPr>
         <p:spPr>
           <a:xfrm>
-            <a:off x="2109001" y="4358322"/>
-            <a:ext cx="722698" cy="300082"/>
+            <a:off x="2179420" y="4367510"/>
+            <a:ext cx="548548" cy="300082"/>
           </a:xfrm>
           <a:prstGeom prst="rect">
             <a:avLst/>
@@ -10539,15 +10633,7 @@
           <a:p>
             <a:r>
               <a:rPr lang="en-US" altLang="zh-CN" sz="1350" smtClean="0"/>
-              <a:t>w</a:t>
-            </a:r>
-            <a:r>
-              <a:rPr lang="en-US" sz="1350" smtClean="0"/>
-              <a:t>ord_</a:t>
-            </a:r>
-            <a:r>
-              <a:rPr lang="en-US" altLang="zh-CN" sz="1350" smtClean="0"/>
-              <a:t>6</a:t>
+              <a:t>hit_6</a:t>
             </a:r>
             <a:endParaRPr lang="en-US" sz="1350" dirty="0"/>
           </a:p>
@@ -10689,8 +10775,8 @@
         </p:nvSpPr>
         <p:spPr>
           <a:xfrm>
-            <a:off x="3081501" y="2087021"/>
-            <a:ext cx="546030" cy="239084"/>
+            <a:off x="3081501" y="2102669"/>
+            <a:ext cx="546030" cy="223435"/>
           </a:xfrm>
           <a:prstGeom prst="rect">
             <a:avLst/>
@@ -11661,6 +11747,376 @@
               <a:t>Diagonal</a:t>
             </a:r>
             <a:endParaRPr lang="en-US" dirty="0"/>
+          </a:p>
+        </p:txBody>
+      </p:sp>
+      <p:sp>
+        <p:nvSpPr>
+          <p:cNvPr id="2" name="TextBox 1"/>
+          <p:cNvSpPr txBox="1"/>
+          <p:nvPr/>
+        </p:nvSpPr>
+        <p:spPr>
+          <a:xfrm>
+            <a:off x="11125200" y="2074333"/>
+            <a:ext cx="184731" cy="369332"/>
+          </a:xfrm>
+          <a:prstGeom prst="rect">
+            <a:avLst/>
+          </a:prstGeom>
+          <a:noFill/>
+        </p:spPr>
+        <p:txBody>
+          <a:bodyPr wrap="none" rtlCol="0">
+            <a:spAutoFit/>
+          </a:bodyPr>
+          <a:lstStyle/>
+          <a:p>
+            <a:endParaRPr lang="en-US" dirty="0"/>
+          </a:p>
+        </p:txBody>
+      </p:sp>
+      <p:sp>
+        <p:nvSpPr>
+          <p:cNvPr id="92" name="Rectangle 91"/>
+          <p:cNvSpPr/>
+          <p:nvPr/>
+        </p:nvSpPr>
+        <p:spPr>
+          <a:xfrm>
+            <a:off x="1390363" y="4051098"/>
+            <a:ext cx="1337605" cy="240936"/>
+          </a:xfrm>
+          <a:prstGeom prst="rect">
+            <a:avLst/>
+          </a:prstGeom>
+          <a:solidFill>
+            <a:schemeClr val="accent4">
+              <a:lumMod val="40000"/>
+              <a:lumOff val="60000"/>
+              <a:alpha val="60000"/>
+            </a:schemeClr>
+          </a:solidFill>
+        </p:spPr>
+        <p:style>
+          <a:lnRef idx="2">
+            <a:schemeClr val="accent1">
+              <a:shade val="50000"/>
+            </a:schemeClr>
+          </a:lnRef>
+          <a:fillRef idx="1">
+            <a:schemeClr val="accent1"/>
+          </a:fillRef>
+          <a:effectRef idx="0">
+            <a:schemeClr val="accent1"/>
+          </a:effectRef>
+          <a:fontRef idx="minor">
+            <a:schemeClr val="lt1"/>
+          </a:fontRef>
+        </p:style>
+        <p:txBody>
+          <a:bodyPr rtlCol="0" anchor="ctr"/>
+          <a:lstStyle/>
+          <a:p>
+            <a:pPr algn="ctr"/>
+            <a:endParaRPr lang="en-US" sz="1350"/>
+          </a:p>
+        </p:txBody>
+      </p:sp>
+      <p:sp>
+        <p:nvSpPr>
+          <p:cNvPr id="4" name="TextBox 3"/>
+          <p:cNvSpPr txBox="1"/>
+          <p:nvPr/>
+        </p:nvSpPr>
+        <p:spPr>
+          <a:xfrm>
+            <a:off x="12319000" y="1811867"/>
+            <a:ext cx="184731" cy="369332"/>
+          </a:xfrm>
+          <a:prstGeom prst="rect">
+            <a:avLst/>
+          </a:prstGeom>
+          <a:noFill/>
+        </p:spPr>
+        <p:txBody>
+          <a:bodyPr wrap="none" rtlCol="0">
+            <a:spAutoFit/>
+          </a:bodyPr>
+          <a:lstStyle/>
+          <a:p>
+            <a:endParaRPr lang="en-US" dirty="0"/>
+          </a:p>
+        </p:txBody>
+      </p:sp>
+      <p:sp>
+        <p:nvSpPr>
+          <p:cNvPr id="93" name="Rectangle 92"/>
+          <p:cNvSpPr/>
+          <p:nvPr/>
+        </p:nvSpPr>
+        <p:spPr>
+          <a:xfrm>
+            <a:off x="3165761" y="4046299"/>
+            <a:ext cx="546030" cy="235540"/>
+          </a:xfrm>
+          <a:prstGeom prst="rect">
+            <a:avLst/>
+          </a:prstGeom>
+        </p:spPr>
+        <p:style>
+          <a:lnRef idx="2">
+            <a:schemeClr val="accent6">
+              <a:shade val="50000"/>
+            </a:schemeClr>
+          </a:lnRef>
+          <a:fillRef idx="1">
+            <a:schemeClr val="accent6"/>
+          </a:fillRef>
+          <a:effectRef idx="0">
+            <a:schemeClr val="accent6"/>
+          </a:effectRef>
+          <a:fontRef idx="minor">
+            <a:schemeClr val="lt1"/>
+          </a:fontRef>
+        </p:style>
+        <p:txBody>
+          <a:bodyPr rtlCol="0" anchor="ctr"/>
+          <a:lstStyle/>
+          <a:p>
+            <a:pPr algn="ctr"/>
+            <a:endParaRPr lang="en-US" sz="1350"/>
+          </a:p>
+        </p:txBody>
+      </p:sp>
+      <p:sp>
+        <p:nvSpPr>
+          <p:cNvPr id="94" name="Rectangle 93"/>
+          <p:cNvSpPr/>
+          <p:nvPr/>
+        </p:nvSpPr>
+        <p:spPr>
+          <a:xfrm>
+            <a:off x="3950277" y="4043419"/>
+            <a:ext cx="546030" cy="239084"/>
+          </a:xfrm>
+          <a:prstGeom prst="rect">
+            <a:avLst/>
+          </a:prstGeom>
+        </p:spPr>
+        <p:style>
+          <a:lnRef idx="2">
+            <a:schemeClr val="accent6">
+              <a:shade val="50000"/>
+            </a:schemeClr>
+          </a:lnRef>
+          <a:fillRef idx="1">
+            <a:schemeClr val="accent6"/>
+          </a:fillRef>
+          <a:effectRef idx="0">
+            <a:schemeClr val="accent6"/>
+          </a:effectRef>
+          <a:fontRef idx="minor">
+            <a:schemeClr val="lt1"/>
+          </a:fontRef>
+        </p:style>
+        <p:txBody>
+          <a:bodyPr rtlCol="0" anchor="ctr"/>
+          <a:lstStyle/>
+          <a:p>
+            <a:pPr algn="ctr"/>
+            <a:endParaRPr lang="en-US" sz="1350"/>
+          </a:p>
+        </p:txBody>
+      </p:sp>
+      <p:sp>
+        <p:nvSpPr>
+          <p:cNvPr id="95" name="Left Brace 94"/>
+          <p:cNvSpPr/>
+          <p:nvPr/>
+        </p:nvSpPr>
+        <p:spPr>
+          <a:xfrm rot="16200000">
+            <a:off x="3394632" y="4081606"/>
+            <a:ext cx="79412" cy="537152"/>
+          </a:xfrm>
+          <a:prstGeom prst="leftBrace">
+            <a:avLst/>
+          </a:prstGeom>
+        </p:spPr>
+        <p:style>
+          <a:lnRef idx="1">
+            <a:schemeClr val="accent1"/>
+          </a:lnRef>
+          <a:fillRef idx="0">
+            <a:schemeClr val="accent1"/>
+          </a:fillRef>
+          <a:effectRef idx="0">
+            <a:schemeClr val="accent1"/>
+          </a:effectRef>
+          <a:fontRef idx="minor">
+            <a:schemeClr val="tx1"/>
+          </a:fontRef>
+        </p:style>
+        <p:txBody>
+          <a:bodyPr rtlCol="0" anchor="ctr"/>
+          <a:lstStyle/>
+          <a:p>
+            <a:pPr algn="ctr"/>
+            <a:endParaRPr lang="en-US" sz="1350"/>
+          </a:p>
+        </p:txBody>
+      </p:sp>
+      <p:sp>
+        <p:nvSpPr>
+          <p:cNvPr id="96" name="Left Brace 95"/>
+          <p:cNvSpPr/>
+          <p:nvPr/>
+        </p:nvSpPr>
+        <p:spPr>
+          <a:xfrm rot="16200000">
+            <a:off x="4179147" y="4110350"/>
+            <a:ext cx="79412" cy="537152"/>
+          </a:xfrm>
+          <a:prstGeom prst="leftBrace">
+            <a:avLst/>
+          </a:prstGeom>
+        </p:spPr>
+        <p:style>
+          <a:lnRef idx="1">
+            <a:schemeClr val="accent1"/>
+          </a:lnRef>
+          <a:fillRef idx="0">
+            <a:schemeClr val="accent1"/>
+          </a:fillRef>
+          <a:effectRef idx="0">
+            <a:schemeClr val="accent1"/>
+          </a:effectRef>
+          <a:fontRef idx="minor">
+            <a:schemeClr val="tx1"/>
+          </a:fontRef>
+        </p:style>
+        <p:txBody>
+          <a:bodyPr rtlCol="0" anchor="ctr"/>
+          <a:lstStyle/>
+          <a:p>
+            <a:pPr algn="ctr"/>
+            <a:endParaRPr lang="en-US" sz="1350"/>
+          </a:p>
+        </p:txBody>
+      </p:sp>
+      <p:sp>
+        <p:nvSpPr>
+          <p:cNvPr id="97" name="TextBox 96"/>
+          <p:cNvSpPr txBox="1"/>
+          <p:nvPr/>
+        </p:nvSpPr>
+        <p:spPr>
+          <a:xfrm>
+            <a:off x="3160063" y="4349518"/>
+            <a:ext cx="548548" cy="300082"/>
+          </a:xfrm>
+          <a:prstGeom prst="rect">
+            <a:avLst/>
+          </a:prstGeom>
+          <a:noFill/>
+        </p:spPr>
+        <p:txBody>
+          <a:bodyPr wrap="none" rtlCol="0">
+            <a:spAutoFit/>
+          </a:bodyPr>
+          <a:lstStyle/>
+          <a:p>
+            <a:r>
+              <a:rPr lang="en-US" altLang="zh-CN" sz="1350" dirty="0" smtClean="0"/>
+              <a:t>hit</a:t>
+            </a:r>
+            <a:r>
+              <a:rPr lang="en-US" sz="1350" dirty="0" smtClean="0"/>
+              <a:t>_</a:t>
+            </a:r>
+            <a:r>
+              <a:rPr lang="en-US" altLang="zh-CN" sz="1350" dirty="0" smtClean="0"/>
+              <a:t>7</a:t>
+            </a:r>
+            <a:endParaRPr lang="en-US" sz="1350" dirty="0"/>
+          </a:p>
+        </p:txBody>
+      </p:sp>
+      <p:sp>
+        <p:nvSpPr>
+          <p:cNvPr id="98" name="TextBox 97"/>
+          <p:cNvSpPr txBox="1"/>
+          <p:nvPr/>
+        </p:nvSpPr>
+        <p:spPr>
+          <a:xfrm>
+            <a:off x="3954818" y="4358706"/>
+            <a:ext cx="548548" cy="300082"/>
+          </a:xfrm>
+          <a:prstGeom prst="rect">
+            <a:avLst/>
+          </a:prstGeom>
+          <a:noFill/>
+        </p:spPr>
+        <p:txBody>
+          <a:bodyPr wrap="none" rtlCol="0">
+            <a:spAutoFit/>
+          </a:bodyPr>
+          <a:lstStyle/>
+          <a:p>
+            <a:r>
+              <a:rPr lang="en-US" altLang="zh-CN" sz="1350" dirty="0" smtClean="0"/>
+              <a:t>hit_8</a:t>
+            </a:r>
+            <a:endParaRPr lang="en-US" sz="1350" dirty="0"/>
+          </a:p>
+        </p:txBody>
+      </p:sp>
+      <p:sp>
+        <p:nvSpPr>
+          <p:cNvPr id="99" name="Rectangle 98"/>
+          <p:cNvSpPr/>
+          <p:nvPr/>
+        </p:nvSpPr>
+        <p:spPr>
+          <a:xfrm>
+            <a:off x="3165761" y="4042294"/>
+            <a:ext cx="1337605" cy="240936"/>
+          </a:xfrm>
+          <a:prstGeom prst="rect">
+            <a:avLst/>
+          </a:prstGeom>
+          <a:solidFill>
+            <a:schemeClr val="accent4">
+              <a:lumMod val="40000"/>
+              <a:lumOff val="60000"/>
+              <a:alpha val="60000"/>
+            </a:schemeClr>
+          </a:solidFill>
+        </p:spPr>
+        <p:style>
+          <a:lnRef idx="2">
+            <a:schemeClr val="accent1">
+              <a:shade val="50000"/>
+            </a:schemeClr>
+          </a:lnRef>
+          <a:fillRef idx="1">
+            <a:schemeClr val="accent1"/>
+          </a:fillRef>
+          <a:effectRef idx="0">
+            <a:schemeClr val="accent1"/>
+          </a:effectRef>
+          <a:fontRef idx="minor">
+            <a:schemeClr val="lt1"/>
+          </a:fontRef>
+        </p:style>
+        <p:txBody>
+          <a:bodyPr rtlCol="0" anchor="ctr"/>
+          <a:lstStyle/>
+          <a:p>
+            <a:pPr algn="ctr"/>
+            <a:endParaRPr lang="en-US" sz="1350"/>
           </a:p>
         </p:txBody>
       </p:sp>
@@ -11703,40 +12159,6 @@
       </p:grpSpPr>
       <p:sp>
         <p:nvSpPr>
-          <p:cNvPr id="49" name="TextBox 48"/>
-          <p:cNvSpPr txBox="1"/>
-          <p:nvPr/>
-        </p:nvSpPr>
-        <p:spPr>
-          <a:xfrm>
-            <a:off x="3787317" y="692628"/>
-            <a:ext cx="1635704" cy="369332"/>
-          </a:xfrm>
-          <a:prstGeom prst="rect">
-            <a:avLst/>
-          </a:prstGeom>
-          <a:noFill/>
-        </p:spPr>
-        <p:txBody>
-          <a:bodyPr wrap="none" rtlCol="0">
-            <a:spAutoFit/>
-          </a:bodyPr>
-          <a:lstStyle/>
-          <a:p>
-            <a:r>
-              <a:rPr lang="en-US" altLang="zh-CN" dirty="0" err="1"/>
-              <a:t>W</a:t>
-            </a:r>
-            <a:r>
-              <a:rPr lang="en-US" altLang="zh-CN" smtClean="0"/>
-              <a:t>ordhitsChunk</a:t>
-            </a:r>
-            <a:endParaRPr lang="en-US" dirty="0"/>
-          </a:p>
-        </p:txBody>
-      </p:sp>
-      <p:sp>
-        <p:nvSpPr>
           <p:cNvPr id="43" name="Rectangle 42"/>
           <p:cNvSpPr/>
           <p:nvPr/>
@@ -11777,6 +12199,78 @@
       </p:sp>
       <p:sp>
         <p:nvSpPr>
+          <p:cNvPr id="24" name="Rectangle 23"/>
+          <p:cNvSpPr/>
+          <p:nvPr/>
+        </p:nvSpPr>
+        <p:spPr>
+          <a:xfrm>
+            <a:off x="3733800" y="2179491"/>
+            <a:ext cx="2073464" cy="268475"/>
+          </a:xfrm>
+          <a:prstGeom prst="rect">
+            <a:avLst/>
+          </a:prstGeom>
+        </p:spPr>
+        <p:style>
+          <a:lnRef idx="3">
+            <a:schemeClr val="lt1"/>
+          </a:lnRef>
+          <a:fillRef idx="1">
+            <a:schemeClr val="accent3"/>
+          </a:fillRef>
+          <a:effectRef idx="1">
+            <a:schemeClr val="accent3"/>
+          </a:effectRef>
+          <a:fontRef idx="minor">
+            <a:schemeClr val="lt1"/>
+          </a:fontRef>
+        </p:style>
+        <p:txBody>
+          <a:bodyPr rtlCol="0" anchor="ctr"/>
+          <a:lstStyle/>
+          <a:p>
+            <a:pPr algn="ctr"/>
+            <a:endParaRPr lang="en-US" sz="1350"/>
+          </a:p>
+        </p:txBody>
+      </p:sp>
+      <p:sp>
+        <p:nvSpPr>
+          <p:cNvPr id="49" name="TextBox 48"/>
+          <p:cNvSpPr txBox="1"/>
+          <p:nvPr/>
+        </p:nvSpPr>
+        <p:spPr>
+          <a:xfrm>
+            <a:off x="3787317" y="692628"/>
+            <a:ext cx="1635704" cy="369332"/>
+          </a:xfrm>
+          <a:prstGeom prst="rect">
+            <a:avLst/>
+          </a:prstGeom>
+          <a:noFill/>
+        </p:spPr>
+        <p:txBody>
+          <a:bodyPr wrap="none" rtlCol="0">
+            <a:spAutoFit/>
+          </a:bodyPr>
+          <a:lstStyle/>
+          <a:p>
+            <a:r>
+              <a:rPr lang="en-US" altLang="zh-CN" dirty="0" err="1"/>
+              <a:t>W</a:t>
+            </a:r>
+            <a:r>
+              <a:rPr lang="en-US" altLang="zh-CN" smtClean="0"/>
+              <a:t>ordhitsChunk</a:t>
+            </a:r>
+            <a:endParaRPr lang="en-US" dirty="0"/>
+          </a:p>
+        </p:txBody>
+      </p:sp>
+      <p:sp>
+        <p:nvSpPr>
           <p:cNvPr id="44" name="Rectangle 43"/>
           <p:cNvSpPr/>
           <p:nvPr/>
@@ -11877,46 +12371,6 @@
       </p:sp>
       <p:sp>
         <p:nvSpPr>
-          <p:cNvPr id="47" name="Rectangle 46"/>
-          <p:cNvSpPr/>
-          <p:nvPr/>
-        </p:nvSpPr>
-        <p:spPr>
-          <a:xfrm>
-            <a:off x="2338597" y="2851877"/>
-            <a:ext cx="1778108" cy="237744"/>
-          </a:xfrm>
-          <a:prstGeom prst="rect">
-            <a:avLst/>
-          </a:prstGeom>
-        </p:spPr>
-        <p:style>
-          <a:lnRef idx="2">
-            <a:schemeClr val="dk1">
-              <a:shade val="50000"/>
-            </a:schemeClr>
-          </a:lnRef>
-          <a:fillRef idx="1">
-            <a:schemeClr val="dk1"/>
-          </a:fillRef>
-          <a:effectRef idx="0">
-            <a:schemeClr val="dk1"/>
-          </a:effectRef>
-          <a:fontRef idx="minor">
-            <a:schemeClr val="lt1"/>
-          </a:fontRef>
-        </p:style>
-        <p:txBody>
-          <a:bodyPr rtlCol="0" anchor="ctr"/>
-          <a:lstStyle/>
-          <a:p>
-            <a:pPr algn="ctr"/>
-            <a:endParaRPr lang="en-US" sz="1350"/>
-          </a:p>
-        </p:txBody>
-      </p:sp>
-      <p:sp>
-        <p:nvSpPr>
           <p:cNvPr id="48" name="Rectangle 47"/>
           <p:cNvSpPr/>
           <p:nvPr/>
@@ -12057,8 +12511,8 @@
         </p:nvSpPr>
         <p:spPr>
           <a:xfrm>
-            <a:off x="3733800" y="2201407"/>
-            <a:ext cx="943137" cy="235540"/>
+            <a:off x="3733800" y="2197863"/>
+            <a:ext cx="943137" cy="239084"/>
           </a:xfrm>
           <a:prstGeom prst="rect">
             <a:avLst/>
@@ -12295,6 +12749,405 @@
           </a:fontRef>
         </p:style>
       </p:cxnSp>
+      <p:sp>
+        <p:nvSpPr>
+          <p:cNvPr id="70" name="TextBox 69"/>
+          <p:cNvSpPr txBox="1"/>
+          <p:nvPr/>
+        </p:nvSpPr>
+        <p:spPr>
+          <a:xfrm>
+            <a:off x="2905505" y="4299438"/>
+            <a:ext cx="3399329" cy="1200329"/>
+          </a:xfrm>
+          <a:prstGeom prst="rect">
+            <a:avLst/>
+          </a:prstGeom>
+          <a:noFill/>
+        </p:spPr>
+        <p:txBody>
+          <a:bodyPr wrap="none" rtlCol="0">
+            <a:spAutoFit/>
+          </a:bodyPr>
+          <a:lstStyle/>
+          <a:p>
+            <a:r>
+              <a:rPr lang="en-US" altLang="zh-CN" dirty="0" err="1" smtClean="0"/>
+              <a:t>WordHitsChunk</a:t>
+            </a:r>
+            <a:endParaRPr lang="en-US" dirty="0"/>
+          </a:p>
+          <a:p>
+            <a:pPr marL="285750" indent="-285750">
+              <a:buFont typeface="Arial" panose="020B0604020202020204" pitchFamily="34" charset="0"/>
+              <a:buChar char="•"/>
+            </a:pPr>
+            <a:r>
+              <a:rPr lang="en-US" dirty="0" err="1"/>
+              <a:t>r</a:t>
+            </a:r>
+            <a:r>
+              <a:rPr lang="en-US" dirty="0" err="1" smtClean="0"/>
+              <a:t>efStart_pos</a:t>
+            </a:r>
+            <a:r>
+              <a:rPr lang="en-US" dirty="0" smtClean="0"/>
+              <a:t>, </a:t>
+            </a:r>
+            <a:r>
+              <a:rPr lang="en-US" dirty="0" err="1" smtClean="0"/>
+              <a:t>refEnd_pos</a:t>
+            </a:r>
+            <a:endParaRPr lang="en-US" dirty="0"/>
+          </a:p>
+          <a:p>
+            <a:pPr marL="285750" indent="-285750">
+              <a:buFont typeface="Arial" panose="020B0604020202020204" pitchFamily="34" charset="0"/>
+              <a:buChar char="•"/>
+            </a:pPr>
+            <a:r>
+              <a:rPr lang="en-US" dirty="0" err="1" smtClean="0"/>
+              <a:t>queryStart_pos</a:t>
+            </a:r>
+            <a:r>
+              <a:rPr lang="en-US" dirty="0" smtClean="0"/>
+              <a:t>, </a:t>
+            </a:r>
+            <a:r>
+              <a:rPr lang="en-US" dirty="0" err="1"/>
+              <a:t>q</a:t>
+            </a:r>
+            <a:r>
+              <a:rPr lang="en-US" dirty="0" err="1" smtClean="0"/>
+              <a:t>ueryEnd_end</a:t>
+            </a:r>
+            <a:endParaRPr lang="en-US" dirty="0"/>
+          </a:p>
+          <a:p>
+            <a:pPr marL="285750" indent="-285750">
+              <a:buFont typeface="Arial" panose="020B0604020202020204" pitchFamily="34" charset="0"/>
+              <a:buChar char="•"/>
+            </a:pPr>
+            <a:r>
+              <a:rPr lang="en-US" dirty="0" smtClean="0"/>
+              <a:t>list </a:t>
+            </a:r>
+            <a:r>
+              <a:rPr lang="en-US" dirty="0"/>
+              <a:t>of </a:t>
+            </a:r>
+            <a:r>
+              <a:rPr lang="en-US" dirty="0" err="1" smtClean="0"/>
+              <a:t>wordhits</a:t>
+            </a:r>
+            <a:endParaRPr lang="en-US" dirty="0"/>
+          </a:p>
+        </p:txBody>
+      </p:sp>
+      <p:sp>
+        <p:nvSpPr>
+          <p:cNvPr id="2" name="Rectangle 1"/>
+          <p:cNvSpPr/>
+          <p:nvPr/>
+        </p:nvSpPr>
+        <p:spPr>
+          <a:xfrm>
+            <a:off x="1961610" y="2433534"/>
+            <a:ext cx="955454" cy="276999"/>
+          </a:xfrm>
+          <a:prstGeom prst="rect">
+            <a:avLst/>
+          </a:prstGeom>
+        </p:spPr>
+        <p:txBody>
+          <a:bodyPr wrap="none">
+            <a:spAutoFit/>
+          </a:bodyPr>
+          <a:lstStyle/>
+          <a:p>
+            <a:r>
+              <a:rPr lang="en-US" sz="1200" dirty="0" err="1"/>
+              <a:t>r</a:t>
+            </a:r>
+            <a:r>
+              <a:rPr lang="en-US" sz="1200" dirty="0" err="1" smtClean="0"/>
+              <a:t>efStart_pos</a:t>
+            </a:r>
+            <a:endParaRPr lang="en-US" sz="1200" dirty="0"/>
+          </a:p>
+        </p:txBody>
+      </p:sp>
+      <p:sp>
+        <p:nvSpPr>
+          <p:cNvPr id="3" name="Rectangle 2"/>
+          <p:cNvSpPr/>
+          <p:nvPr/>
+        </p:nvSpPr>
+        <p:spPr>
+          <a:xfrm>
+            <a:off x="4914072" y="2517204"/>
+            <a:ext cx="893193" cy="276999"/>
+          </a:xfrm>
+          <a:prstGeom prst="rect">
+            <a:avLst/>
+          </a:prstGeom>
+        </p:spPr>
+        <p:txBody>
+          <a:bodyPr wrap="none">
+            <a:spAutoFit/>
+          </a:bodyPr>
+          <a:lstStyle/>
+          <a:p>
+            <a:r>
+              <a:rPr lang="en-US" sz="1200" dirty="0" err="1" smtClean="0"/>
+              <a:t>refEnd_pos</a:t>
+            </a:r>
+            <a:endParaRPr lang="en-US" sz="1200" dirty="0"/>
+          </a:p>
+        </p:txBody>
+      </p:sp>
+      <p:sp>
+        <p:nvSpPr>
+          <p:cNvPr id="8" name="Rectangle 7"/>
+          <p:cNvSpPr/>
+          <p:nvPr/>
+        </p:nvSpPr>
+        <p:spPr>
+          <a:xfrm>
+            <a:off x="1130726" y="3146389"/>
+            <a:ext cx="1142044" cy="276999"/>
+          </a:xfrm>
+          <a:prstGeom prst="rect">
+            <a:avLst/>
+          </a:prstGeom>
+        </p:spPr>
+        <p:txBody>
+          <a:bodyPr wrap="none">
+            <a:spAutoFit/>
+          </a:bodyPr>
+          <a:lstStyle/>
+          <a:p>
+            <a:r>
+              <a:rPr lang="en-US" sz="1200" dirty="0" err="1" smtClean="0"/>
+              <a:t>queryStart_pos</a:t>
+            </a:r>
+            <a:endParaRPr lang="en-US" sz="1200" dirty="0"/>
+          </a:p>
+        </p:txBody>
+      </p:sp>
+      <p:sp>
+        <p:nvSpPr>
+          <p:cNvPr id="9" name="Rectangle 8"/>
+          <p:cNvSpPr/>
+          <p:nvPr/>
+        </p:nvSpPr>
+        <p:spPr>
+          <a:xfrm>
+            <a:off x="4228635" y="3146389"/>
+            <a:ext cx="1079783" cy="276999"/>
+          </a:xfrm>
+          <a:prstGeom prst="rect">
+            <a:avLst/>
+          </a:prstGeom>
+        </p:spPr>
+        <p:txBody>
+          <a:bodyPr wrap="none">
+            <a:spAutoFit/>
+          </a:bodyPr>
+          <a:lstStyle/>
+          <a:p>
+            <a:r>
+              <a:rPr lang="en-US" sz="1200" dirty="0" err="1" smtClean="0"/>
+              <a:t>queryEnd_pos</a:t>
+            </a:r>
+            <a:endParaRPr lang="en-US" sz="1200" dirty="0"/>
+          </a:p>
+        </p:txBody>
+      </p:sp>
+      <p:sp>
+        <p:nvSpPr>
+          <p:cNvPr id="38" name="Rectangle 37"/>
+          <p:cNvSpPr/>
+          <p:nvPr/>
+        </p:nvSpPr>
+        <p:spPr>
+          <a:xfrm>
+            <a:off x="3726530" y="2187142"/>
+            <a:ext cx="2080734" cy="260823"/>
+          </a:xfrm>
+          <a:prstGeom prst="rect">
+            <a:avLst/>
+          </a:prstGeom>
+          <a:solidFill>
+            <a:schemeClr val="accent4">
+              <a:lumMod val="40000"/>
+              <a:lumOff val="60000"/>
+              <a:alpha val="60000"/>
+            </a:schemeClr>
+          </a:solidFill>
+        </p:spPr>
+        <p:style>
+          <a:lnRef idx="2">
+            <a:schemeClr val="accent1">
+              <a:shade val="50000"/>
+            </a:schemeClr>
+          </a:lnRef>
+          <a:fillRef idx="1">
+            <a:schemeClr val="accent1"/>
+          </a:fillRef>
+          <a:effectRef idx="0">
+            <a:schemeClr val="accent1"/>
+          </a:effectRef>
+          <a:fontRef idx="minor">
+            <a:schemeClr val="lt1"/>
+          </a:fontRef>
+        </p:style>
+        <p:txBody>
+          <a:bodyPr rtlCol="0" anchor="ctr"/>
+          <a:lstStyle/>
+          <a:p>
+            <a:pPr algn="ctr"/>
+            <a:endParaRPr lang="en-US" sz="1350"/>
+          </a:p>
+        </p:txBody>
+      </p:sp>
+      <p:sp>
+        <p:nvSpPr>
+          <p:cNvPr id="39" name="Rectangle 38"/>
+          <p:cNvSpPr/>
+          <p:nvPr/>
+        </p:nvSpPr>
+        <p:spPr>
+          <a:xfrm>
+            <a:off x="2338428" y="2849479"/>
+            <a:ext cx="2293251" cy="261242"/>
+          </a:xfrm>
+          <a:prstGeom prst="rect">
+            <a:avLst/>
+          </a:prstGeom>
+          <a:solidFill>
+            <a:schemeClr val="accent4">
+              <a:lumMod val="40000"/>
+              <a:lumOff val="60000"/>
+              <a:alpha val="60000"/>
+            </a:schemeClr>
+          </a:solidFill>
+        </p:spPr>
+        <p:style>
+          <a:lnRef idx="2">
+            <a:schemeClr val="accent1">
+              <a:shade val="50000"/>
+            </a:schemeClr>
+          </a:lnRef>
+          <a:fillRef idx="1">
+            <a:schemeClr val="accent1"/>
+          </a:fillRef>
+          <a:effectRef idx="0">
+            <a:schemeClr val="accent1"/>
+          </a:effectRef>
+          <a:fontRef idx="minor">
+            <a:schemeClr val="lt1"/>
+          </a:fontRef>
+        </p:style>
+        <p:txBody>
+          <a:bodyPr rtlCol="0" anchor="ctr"/>
+          <a:lstStyle/>
+          <a:p>
+            <a:pPr algn="ctr"/>
+            <a:endParaRPr lang="en-US" sz="1350"/>
+          </a:p>
+        </p:txBody>
+      </p:sp>
+      <p:sp>
+        <p:nvSpPr>
+          <p:cNvPr id="40" name="Rectangle 39"/>
+          <p:cNvSpPr/>
+          <p:nvPr/>
+        </p:nvSpPr>
+        <p:spPr>
+          <a:xfrm>
+            <a:off x="3534171" y="2197863"/>
+            <a:ext cx="192358" cy="242024"/>
+          </a:xfrm>
+          <a:prstGeom prst="rect">
+            <a:avLst/>
+          </a:prstGeom>
+          <a:solidFill>
+            <a:schemeClr val="bg2">
+              <a:lumMod val="75000"/>
+            </a:schemeClr>
+          </a:solidFill>
+        </p:spPr>
+        <p:style>
+          <a:lnRef idx="2">
+            <a:schemeClr val="accent2">
+              <a:shade val="50000"/>
+            </a:schemeClr>
+          </a:lnRef>
+          <a:fillRef idx="1">
+            <a:schemeClr val="accent2"/>
+          </a:fillRef>
+          <a:effectRef idx="0">
+            <a:schemeClr val="accent2"/>
+          </a:effectRef>
+          <a:fontRef idx="minor">
+            <a:schemeClr val="lt1"/>
+          </a:fontRef>
+        </p:style>
+        <p:txBody>
+          <a:bodyPr rtlCol="0" anchor="ctr"/>
+          <a:lstStyle/>
+          <a:p>
+            <a:pPr algn="ctr"/>
+            <a:endParaRPr lang="en-US" sz="1350"/>
+          </a:p>
+        </p:txBody>
+      </p:sp>
+      <p:sp>
+        <p:nvSpPr>
+          <p:cNvPr id="41" name="Rectangle 40"/>
+          <p:cNvSpPr/>
+          <p:nvPr/>
+        </p:nvSpPr>
+        <p:spPr>
+          <a:xfrm>
+            <a:off x="5804152" y="2205644"/>
+            <a:ext cx="192358" cy="242024"/>
+          </a:xfrm>
+          <a:prstGeom prst="rect">
+            <a:avLst/>
+          </a:prstGeom>
+          <a:solidFill>
+            <a:schemeClr val="bg2">
+              <a:lumMod val="75000"/>
+            </a:schemeClr>
+          </a:solidFill>
+        </p:spPr>
+        <p:style>
+          <a:lnRef idx="2">
+            <a:schemeClr val="accent2">
+              <a:shade val="50000"/>
+            </a:schemeClr>
+          </a:lnRef>
+          <a:fillRef idx="1">
+            <a:schemeClr val="accent2"/>
+          </a:fillRef>
+          <a:effectRef idx="0">
+            <a:schemeClr val="accent2"/>
+          </a:effectRef>
+          <a:fontRef idx="minor">
+            <a:schemeClr val="lt1"/>
+          </a:fontRef>
+        </p:style>
+        <p:txBody>
+          <a:bodyPr rtlCol="0" anchor="ctr"/>
+          <a:lstStyle/>
+          <a:p>
+            <a:pPr algn="ctr"/>
+            <a:endParaRPr lang="en-US" sz="1350"/>
+          </a:p>
+        </p:txBody>
+      </p:sp>
       <p:cxnSp>
         <p:nvCxnSpPr>
           <p:cNvPr id="64" name="Straight Arrow Connector 63"/>
@@ -12305,8 +13158,8 @@
         </p:nvCxnSpPr>
         <p:spPr>
           <a:xfrm flipV="1">
-            <a:off x="2338430" y="2319177"/>
-            <a:ext cx="1395370" cy="531227"/>
+            <a:off x="2338430" y="2317405"/>
+            <a:ext cx="1395370" cy="533000"/>
           </a:xfrm>
           <a:prstGeom prst="straightConnector1">
             <a:avLst/>
@@ -12366,225 +13219,6 @@
           </a:fontRef>
         </p:style>
       </p:cxnSp>
-      <p:sp>
-        <p:nvSpPr>
-          <p:cNvPr id="70" name="TextBox 69"/>
-          <p:cNvSpPr txBox="1"/>
-          <p:nvPr/>
-        </p:nvSpPr>
-        <p:spPr>
-          <a:xfrm>
-            <a:off x="2905505" y="4299438"/>
-            <a:ext cx="3399329" cy="1200329"/>
-          </a:xfrm>
-          <a:prstGeom prst="rect">
-            <a:avLst/>
-          </a:prstGeom>
-          <a:noFill/>
-        </p:spPr>
-        <p:txBody>
-          <a:bodyPr wrap="none" rtlCol="0">
-            <a:spAutoFit/>
-          </a:bodyPr>
-          <a:lstStyle/>
-          <a:p>
-            <a:r>
-              <a:rPr lang="en-US" altLang="zh-CN" dirty="0" err="1" smtClean="0"/>
-              <a:t>W</a:t>
-            </a:r>
-            <a:r>
-              <a:rPr lang="en-US" altLang="zh-CN" dirty="0" err="1" smtClean="0"/>
-              <a:t>ordHitsChunk</a:t>
-            </a:r>
-            <a:endParaRPr lang="en-US" dirty="0"/>
-          </a:p>
-          <a:p>
-            <a:pPr marL="285750" indent="-285750">
-              <a:buFont typeface="Arial" panose="020B0604020202020204" pitchFamily="34" charset="0"/>
-              <a:buChar char="•"/>
-            </a:pPr>
-            <a:r>
-              <a:rPr lang="en-US" dirty="0" err="1"/>
-              <a:t>r</a:t>
-            </a:r>
-            <a:r>
-              <a:rPr lang="en-US" dirty="0" err="1" smtClean="0"/>
-              <a:t>efStart_pos</a:t>
-            </a:r>
-            <a:r>
-              <a:rPr lang="en-US" dirty="0" smtClean="0"/>
-              <a:t>, </a:t>
-            </a:r>
-            <a:r>
-              <a:rPr lang="en-US" dirty="0" err="1" smtClean="0"/>
-              <a:t>refEnd_pos</a:t>
-            </a:r>
-            <a:endParaRPr lang="en-US" dirty="0"/>
-          </a:p>
-          <a:p>
-            <a:pPr marL="285750" indent="-285750">
-              <a:buFont typeface="Arial" panose="020B0604020202020204" pitchFamily="34" charset="0"/>
-              <a:buChar char="•"/>
-            </a:pPr>
-            <a:r>
-              <a:rPr lang="en-US" dirty="0" err="1" smtClean="0"/>
-              <a:t>queryStart_pos</a:t>
-            </a:r>
-            <a:r>
-              <a:rPr lang="en-US" dirty="0" smtClean="0"/>
-              <a:t>, </a:t>
-            </a:r>
-            <a:r>
-              <a:rPr lang="en-US" dirty="0" err="1"/>
-              <a:t>q</a:t>
-            </a:r>
-            <a:r>
-              <a:rPr lang="en-US" dirty="0" err="1" smtClean="0"/>
-              <a:t>ueryEnd_end</a:t>
-            </a:r>
-            <a:endParaRPr lang="en-US" dirty="0"/>
-          </a:p>
-          <a:p>
-            <a:pPr marL="285750" indent="-285750">
-              <a:buFont typeface="Arial" panose="020B0604020202020204" pitchFamily="34" charset="0"/>
-              <a:buChar char="•"/>
-            </a:pPr>
-            <a:r>
-              <a:rPr lang="en-US" dirty="0" smtClean="0"/>
-              <a:t>list </a:t>
-            </a:r>
-            <a:r>
-              <a:rPr lang="en-US" dirty="0"/>
-              <a:t>of </a:t>
-            </a:r>
-            <a:r>
-              <a:rPr lang="en-US" dirty="0" err="1" smtClean="0"/>
-              <a:t>wordhits</a:t>
-            </a:r>
-            <a:endParaRPr lang="en-US" dirty="0"/>
-          </a:p>
-        </p:txBody>
-      </p:sp>
-      <p:sp>
-        <p:nvSpPr>
-          <p:cNvPr id="2" name="Rectangle 1"/>
-          <p:cNvSpPr/>
-          <p:nvPr/>
-        </p:nvSpPr>
-        <p:spPr>
-          <a:xfrm>
-            <a:off x="1961610" y="2433534"/>
-            <a:ext cx="955454" cy="276999"/>
-          </a:xfrm>
-          <a:prstGeom prst="rect">
-            <a:avLst/>
-          </a:prstGeom>
-        </p:spPr>
-        <p:txBody>
-          <a:bodyPr wrap="none">
-            <a:spAutoFit/>
-          </a:bodyPr>
-          <a:lstStyle/>
-          <a:p>
-            <a:r>
-              <a:rPr lang="en-US" sz="1200" dirty="0" err="1"/>
-              <a:t>r</a:t>
-            </a:r>
-            <a:r>
-              <a:rPr lang="en-US" sz="1200" dirty="0" err="1" smtClean="0"/>
-              <a:t>efStart_pos</a:t>
-            </a:r>
-            <a:endParaRPr lang="en-US" sz="1200" dirty="0"/>
-          </a:p>
-        </p:txBody>
-      </p:sp>
-      <p:sp>
-        <p:nvSpPr>
-          <p:cNvPr id="3" name="Rectangle 2"/>
-          <p:cNvSpPr/>
-          <p:nvPr/>
-        </p:nvSpPr>
-        <p:spPr>
-          <a:xfrm>
-            <a:off x="4914072" y="2517204"/>
-            <a:ext cx="893193" cy="276999"/>
-          </a:xfrm>
-          <a:prstGeom prst="rect">
-            <a:avLst/>
-          </a:prstGeom>
-        </p:spPr>
-        <p:txBody>
-          <a:bodyPr wrap="none">
-            <a:spAutoFit/>
-          </a:bodyPr>
-          <a:lstStyle/>
-          <a:p>
-            <a:r>
-              <a:rPr lang="en-US" sz="1200" dirty="0" err="1" smtClean="0"/>
-              <a:t>refEnd_pos</a:t>
-            </a:r>
-            <a:endParaRPr lang="en-US" sz="1200" dirty="0"/>
-          </a:p>
-        </p:txBody>
-      </p:sp>
-      <p:sp>
-        <p:nvSpPr>
-          <p:cNvPr id="8" name="Rectangle 7"/>
-          <p:cNvSpPr/>
-          <p:nvPr/>
-        </p:nvSpPr>
-        <p:spPr>
-          <a:xfrm>
-            <a:off x="1130726" y="3146389"/>
-            <a:ext cx="1142044" cy="276999"/>
-          </a:xfrm>
-          <a:prstGeom prst="rect">
-            <a:avLst/>
-          </a:prstGeom>
-        </p:spPr>
-        <p:txBody>
-          <a:bodyPr wrap="none">
-            <a:spAutoFit/>
-          </a:bodyPr>
-          <a:lstStyle/>
-          <a:p>
-            <a:r>
-              <a:rPr lang="en-US" sz="1200" dirty="0" err="1" smtClean="0"/>
-              <a:t>queryStart_pos</a:t>
-            </a:r>
-            <a:endParaRPr lang="en-US" sz="1200" dirty="0"/>
-          </a:p>
-        </p:txBody>
-      </p:sp>
-      <p:sp>
-        <p:nvSpPr>
-          <p:cNvPr id="9" name="Rectangle 8"/>
-          <p:cNvSpPr/>
-          <p:nvPr/>
-        </p:nvSpPr>
-        <p:spPr>
-          <a:xfrm>
-            <a:off x="4228635" y="3146389"/>
-            <a:ext cx="1079783" cy="276999"/>
-          </a:xfrm>
-          <a:prstGeom prst="rect">
-            <a:avLst/>
-          </a:prstGeom>
-        </p:spPr>
-        <p:txBody>
-          <a:bodyPr wrap="none">
-            <a:spAutoFit/>
-          </a:bodyPr>
-          <a:lstStyle/>
-          <a:p>
-            <a:r>
-              <a:rPr lang="en-US" sz="1200" dirty="0" err="1" smtClean="0"/>
-              <a:t>queryEnd_pos</a:t>
-            </a:r>
-            <a:endParaRPr lang="en-US" sz="1200" dirty="0"/>
-          </a:p>
-        </p:txBody>
-      </p:sp>
     </p:spTree>
     <p:extLst>
       <p:ext uri="{BB962C8B-B14F-4D97-AF65-F5344CB8AC3E}">
@@ -12624,39 +13258,39 @@
       </p:grpSpPr>
       <p:sp>
         <p:nvSpPr>
-          <p:cNvPr id="49" name="TextBox 48"/>
-          <p:cNvSpPr txBox="1"/>
-          <p:nvPr/>
-        </p:nvSpPr>
-        <p:spPr>
-          <a:xfrm>
-            <a:off x="3700800" y="1277317"/>
-            <a:ext cx="2148089" cy="369332"/>
-          </a:xfrm>
-          <a:prstGeom prst="rect">
-            <a:avLst/>
-          </a:prstGeom>
-          <a:noFill/>
-        </p:spPr>
-        <p:txBody>
-          <a:bodyPr wrap="none" rtlCol="0">
-            <a:spAutoFit/>
-          </a:bodyPr>
-          <a:lstStyle/>
-          <a:p>
-            <a:r>
-              <a:rPr lang="en-US" altLang="zh-CN" dirty="0" smtClean="0"/>
-              <a:t>Align</a:t>
-            </a:r>
-            <a:r>
-              <a:rPr lang="zh-CN" altLang="en-US" dirty="0" smtClean="0"/>
-              <a:t> </a:t>
-            </a:r>
-            <a:r>
-              <a:rPr lang="en-US" altLang="zh-CN" dirty="0" err="1" smtClean="0"/>
-              <a:t>wordHitsChunk</a:t>
-            </a:r>
-            <a:endParaRPr lang="en-US" dirty="0"/>
+          <p:cNvPr id="34" name="Rectangle 33"/>
+          <p:cNvSpPr/>
+          <p:nvPr/>
+        </p:nvSpPr>
+        <p:spPr>
+          <a:xfrm>
+            <a:off x="2338597" y="2410476"/>
+            <a:ext cx="2699070" cy="254950"/>
+          </a:xfrm>
+          <a:prstGeom prst="rect">
+            <a:avLst/>
+          </a:prstGeom>
+        </p:spPr>
+        <p:style>
+          <a:lnRef idx="3">
+            <a:schemeClr val="lt1"/>
+          </a:lnRef>
+          <a:fillRef idx="1">
+            <a:schemeClr val="accent3"/>
+          </a:fillRef>
+          <a:effectRef idx="1">
+            <a:schemeClr val="accent3"/>
+          </a:effectRef>
+          <a:fontRef idx="minor">
+            <a:schemeClr val="lt1"/>
+          </a:fontRef>
+        </p:style>
+        <p:txBody>
+          <a:bodyPr rtlCol="0" anchor="ctr"/>
+          <a:lstStyle/>
+          <a:p>
+            <a:pPr algn="ctr"/>
+            <a:endParaRPr lang="en-US" sz="1350"/>
           </a:p>
         </p:txBody>
       </p:sp>
@@ -12702,6 +13336,90 @@
       </p:sp>
       <p:sp>
         <p:nvSpPr>
+          <p:cNvPr id="33" name="Rectangle 32"/>
+          <p:cNvSpPr/>
+          <p:nvPr/>
+        </p:nvSpPr>
+        <p:spPr>
+          <a:xfrm>
+            <a:off x="2338597" y="2834908"/>
+            <a:ext cx="2699070" cy="254950"/>
+          </a:xfrm>
+          <a:prstGeom prst="rect">
+            <a:avLst/>
+          </a:prstGeom>
+        </p:spPr>
+        <p:style>
+          <a:lnRef idx="3">
+            <a:schemeClr val="lt1"/>
+          </a:lnRef>
+          <a:fillRef idx="1">
+            <a:schemeClr val="accent3"/>
+          </a:fillRef>
+          <a:effectRef idx="1">
+            <a:schemeClr val="accent3"/>
+          </a:effectRef>
+          <a:fontRef idx="minor">
+            <a:schemeClr val="lt1"/>
+          </a:fontRef>
+        </p:style>
+        <p:txBody>
+          <a:bodyPr rtlCol="0" anchor="ctr"/>
+          <a:lstStyle/>
+          <a:p>
+            <a:pPr algn="ctr"/>
+            <a:endParaRPr lang="en-US" sz="1350"/>
+          </a:p>
+        </p:txBody>
+      </p:sp>
+      <p:sp>
+        <p:nvSpPr>
+          <p:cNvPr id="49" name="TextBox 48"/>
+          <p:cNvSpPr txBox="1"/>
+          <p:nvPr/>
+        </p:nvSpPr>
+        <p:spPr>
+          <a:xfrm>
+            <a:off x="2312869" y="752383"/>
+            <a:ext cx="4280916" cy="369332"/>
+          </a:xfrm>
+          <a:prstGeom prst="rect">
+            <a:avLst/>
+          </a:prstGeom>
+          <a:noFill/>
+        </p:spPr>
+        <p:txBody>
+          <a:bodyPr wrap="none" rtlCol="0">
+            <a:spAutoFit/>
+          </a:bodyPr>
+          <a:lstStyle/>
+          <a:p>
+            <a:r>
+              <a:rPr lang="en-US" altLang="zh-CN" dirty="0" smtClean="0"/>
+              <a:t>Align</a:t>
+            </a:r>
+            <a:r>
+              <a:rPr lang="zh-CN" altLang="en-US" dirty="0" smtClean="0"/>
+              <a:t> </a:t>
+            </a:r>
+            <a:r>
+              <a:rPr lang="en-US" altLang="zh-CN" dirty="0" err="1" smtClean="0"/>
+              <a:t>wordHitsChunk</a:t>
+            </a:r>
+            <a:r>
+              <a:rPr lang="en-US" altLang="zh-CN" dirty="0" smtClean="0"/>
+              <a:t> within </a:t>
+            </a:r>
+            <a:r>
+              <a:rPr lang="en-US" altLang="zh-CN" dirty="0" err="1" smtClean="0"/>
+              <a:t>wordHitsGroup</a:t>
+            </a:r>
+            <a:endParaRPr lang="en-US" dirty="0"/>
+          </a:p>
+        </p:txBody>
+      </p:sp>
+      <p:sp>
+        <p:nvSpPr>
           <p:cNvPr id="44" name="Rectangle 43"/>
           <p:cNvSpPr/>
           <p:nvPr/>
@@ -12969,7 +13687,7 @@
         <p:spPr>
           <a:xfrm>
             <a:off x="1305325" y="4221246"/>
-            <a:ext cx="7493094" cy="1754326"/>
+            <a:ext cx="7034342" cy="1773154"/>
           </a:xfrm>
           <a:prstGeom prst="rect">
             <a:avLst/>
@@ -13188,46 +13906,6 @@
           </a:fillRef>
           <a:effectRef idx="0">
             <a:schemeClr val="accent6"/>
-          </a:effectRef>
-          <a:fontRef idx="minor">
-            <a:schemeClr val="lt1"/>
-          </a:fontRef>
-        </p:style>
-        <p:txBody>
-          <a:bodyPr rtlCol="0" anchor="ctr"/>
-          <a:lstStyle/>
-          <a:p>
-            <a:pPr algn="ctr"/>
-            <a:endParaRPr lang="en-US" sz="1350"/>
-          </a:p>
-        </p:txBody>
-      </p:sp>
-      <p:sp>
-        <p:nvSpPr>
-          <p:cNvPr id="27" name="Rectangle 26"/>
-          <p:cNvSpPr/>
-          <p:nvPr/>
-        </p:nvSpPr>
-        <p:spPr>
-          <a:xfrm>
-            <a:off x="2479479" y="2415965"/>
-            <a:ext cx="2387745" cy="237744"/>
-          </a:xfrm>
-          <a:prstGeom prst="rect">
-            <a:avLst/>
-          </a:prstGeom>
-        </p:spPr>
-        <p:style>
-          <a:lnRef idx="2">
-            <a:schemeClr val="dk1">
-              <a:shade val="50000"/>
-            </a:schemeClr>
-          </a:lnRef>
-          <a:fillRef idx="1">
-            <a:schemeClr val="dk1"/>
-          </a:fillRef>
-          <a:effectRef idx="0">
-            <a:schemeClr val="dk1"/>
           </a:effectRef>
           <a:fontRef idx="minor">
             <a:schemeClr val="lt1"/>
@@ -13462,68 +14140,6 @@
           </a:fontRef>
         </p:style>
       </p:cxnSp>
-      <p:cxnSp>
-        <p:nvCxnSpPr>
-          <p:cNvPr id="61" name="Straight Connector 60"/>
-          <p:cNvCxnSpPr/>
-          <p:nvPr/>
-        </p:nvCxnSpPr>
-        <p:spPr>
-          <a:xfrm flipH="1">
-            <a:off x="4180311" y="3078820"/>
-            <a:ext cx="139577" cy="448904"/>
-          </a:xfrm>
-          <a:prstGeom prst="line">
-            <a:avLst/>
-          </a:prstGeom>
-          <a:ln w="25400"/>
-        </p:spPr>
-        <p:style>
-          <a:lnRef idx="1">
-            <a:schemeClr val="accent1"/>
-          </a:lnRef>
-          <a:fillRef idx="0">
-            <a:schemeClr val="accent1"/>
-          </a:fillRef>
-          <a:effectRef idx="0">
-            <a:schemeClr val="accent1"/>
-          </a:effectRef>
-          <a:fontRef idx="minor">
-            <a:schemeClr val="tx1"/>
-          </a:fontRef>
-        </p:style>
-      </p:cxnSp>
-      <p:cxnSp>
-        <p:nvCxnSpPr>
-          <p:cNvPr id="63" name="Straight Connector 62"/>
-          <p:cNvCxnSpPr/>
-          <p:nvPr/>
-        </p:nvCxnSpPr>
-        <p:spPr>
-          <a:xfrm>
-            <a:off x="3795785" y="3072886"/>
-            <a:ext cx="41413" cy="454838"/>
-          </a:xfrm>
-          <a:prstGeom prst="line">
-            <a:avLst/>
-          </a:prstGeom>
-          <a:ln w="25400"/>
-        </p:spPr>
-        <p:style>
-          <a:lnRef idx="1">
-            <a:schemeClr val="accent1"/>
-          </a:lnRef>
-          <a:fillRef idx="0">
-            <a:schemeClr val="accent1"/>
-          </a:fillRef>
-          <a:effectRef idx="0">
-            <a:schemeClr val="accent1"/>
-          </a:effectRef>
-          <a:fontRef idx="minor">
-            <a:schemeClr val="tx1"/>
-          </a:fontRef>
-        </p:style>
-      </p:cxnSp>
       <p:sp>
         <p:nvSpPr>
           <p:cNvPr id="2" name="TextBox 1"/>
@@ -13556,31 +14172,189 @@
       </p:sp>
       <p:sp>
         <p:nvSpPr>
-          <p:cNvPr id="32" name="TextBox 31"/>
-          <p:cNvSpPr txBox="1"/>
-          <p:nvPr/>
-        </p:nvSpPr>
-        <p:spPr>
-          <a:xfrm>
-            <a:off x="3776158" y="3131898"/>
-            <a:ext cx="521938" cy="369332"/>
-          </a:xfrm>
-          <a:prstGeom prst="rect">
-            <a:avLst/>
-          </a:prstGeom>
-          <a:noFill/>
-        </p:spPr>
-        <p:txBody>
-          <a:bodyPr wrap="none" rtlCol="0">
-            <a:spAutoFit/>
-          </a:bodyPr>
-          <a:lstStyle/>
-          <a:p>
-            <a:r>
-              <a:rPr lang="en-US" smtClean="0"/>
-              <a:t>gap</a:t>
-            </a:r>
-            <a:endParaRPr lang="en-US"/>
+          <p:cNvPr id="40" name="Rectangle 39"/>
+          <p:cNvSpPr/>
+          <p:nvPr/>
+        </p:nvSpPr>
+        <p:spPr>
+          <a:xfrm>
+            <a:off x="2479314" y="2833309"/>
+            <a:ext cx="1314032" cy="254722"/>
+          </a:xfrm>
+          <a:prstGeom prst="rect">
+            <a:avLst/>
+          </a:prstGeom>
+          <a:solidFill>
+            <a:schemeClr val="accent4">
+              <a:lumMod val="40000"/>
+              <a:lumOff val="60000"/>
+              <a:alpha val="60000"/>
+            </a:schemeClr>
+          </a:solidFill>
+        </p:spPr>
+        <p:style>
+          <a:lnRef idx="2">
+            <a:schemeClr val="accent1">
+              <a:shade val="50000"/>
+            </a:schemeClr>
+          </a:lnRef>
+          <a:fillRef idx="1">
+            <a:schemeClr val="accent1"/>
+          </a:fillRef>
+          <a:effectRef idx="0">
+            <a:schemeClr val="accent1"/>
+          </a:effectRef>
+          <a:fontRef idx="minor">
+            <a:schemeClr val="lt1"/>
+          </a:fontRef>
+        </p:style>
+        <p:txBody>
+          <a:bodyPr rtlCol="0" anchor="ctr"/>
+          <a:lstStyle/>
+          <a:p>
+            <a:pPr algn="ctr"/>
+            <a:endParaRPr lang="en-US" sz="1350"/>
+          </a:p>
+        </p:txBody>
+      </p:sp>
+      <p:sp>
+        <p:nvSpPr>
+          <p:cNvPr id="42" name="Rectangle 41"/>
+          <p:cNvSpPr/>
+          <p:nvPr/>
+        </p:nvSpPr>
+        <p:spPr>
+          <a:xfrm>
+            <a:off x="2476906" y="2409875"/>
+            <a:ext cx="1314032" cy="254722"/>
+          </a:xfrm>
+          <a:prstGeom prst="rect">
+            <a:avLst/>
+          </a:prstGeom>
+          <a:solidFill>
+            <a:schemeClr val="accent4">
+              <a:lumMod val="40000"/>
+              <a:lumOff val="60000"/>
+              <a:alpha val="60000"/>
+            </a:schemeClr>
+          </a:solidFill>
+        </p:spPr>
+        <p:style>
+          <a:lnRef idx="2">
+            <a:schemeClr val="accent1">
+              <a:shade val="50000"/>
+            </a:schemeClr>
+          </a:lnRef>
+          <a:fillRef idx="1">
+            <a:schemeClr val="accent1"/>
+          </a:fillRef>
+          <a:effectRef idx="0">
+            <a:schemeClr val="accent1"/>
+          </a:effectRef>
+          <a:fontRef idx="minor">
+            <a:schemeClr val="lt1"/>
+          </a:fontRef>
+        </p:style>
+        <p:txBody>
+          <a:bodyPr rtlCol="0" anchor="ctr"/>
+          <a:lstStyle/>
+          <a:p>
+            <a:pPr algn="ctr"/>
+            <a:endParaRPr lang="en-US" sz="1350"/>
+          </a:p>
+        </p:txBody>
+      </p:sp>
+      <p:sp>
+        <p:nvSpPr>
+          <p:cNvPr id="47" name="Rectangle 46"/>
+          <p:cNvSpPr/>
+          <p:nvPr/>
+        </p:nvSpPr>
+        <p:spPr>
+          <a:xfrm>
+            <a:off x="4263826" y="2398627"/>
+            <a:ext cx="658154" cy="282692"/>
+          </a:xfrm>
+          <a:prstGeom prst="rect">
+            <a:avLst/>
+          </a:prstGeom>
+          <a:solidFill>
+            <a:schemeClr val="accent4">
+              <a:lumMod val="40000"/>
+              <a:lumOff val="60000"/>
+              <a:alpha val="60000"/>
+            </a:schemeClr>
+          </a:solidFill>
+        </p:spPr>
+        <p:style>
+          <a:lnRef idx="2">
+            <a:schemeClr val="accent1">
+              <a:shade val="50000"/>
+            </a:schemeClr>
+          </a:lnRef>
+          <a:fillRef idx="1">
+            <a:schemeClr val="accent1"/>
+          </a:fillRef>
+          <a:effectRef idx="0">
+            <a:schemeClr val="accent1"/>
+          </a:effectRef>
+          <a:fontRef idx="minor">
+            <a:schemeClr val="lt1"/>
+          </a:fontRef>
+        </p:style>
+        <p:txBody>
+          <a:bodyPr rtlCol="0" anchor="ctr"/>
+          <a:lstStyle/>
+          <a:p>
+            <a:pPr algn="ctr"/>
+            <a:endParaRPr lang="en-US" sz="1350"/>
+          </a:p>
+        </p:txBody>
+      </p:sp>
+      <p:sp>
+        <p:nvSpPr>
+          <p:cNvPr id="48" name="Rectangle 47"/>
+          <p:cNvSpPr/>
+          <p:nvPr/>
+        </p:nvSpPr>
+        <p:spPr>
+          <a:xfrm>
+            <a:off x="4263826" y="2822919"/>
+            <a:ext cx="658154" cy="282692"/>
+          </a:xfrm>
+          <a:prstGeom prst="rect">
+            <a:avLst/>
+          </a:prstGeom>
+          <a:solidFill>
+            <a:schemeClr val="accent4">
+              <a:lumMod val="40000"/>
+              <a:lumOff val="60000"/>
+              <a:alpha val="60000"/>
+            </a:schemeClr>
+          </a:solidFill>
+        </p:spPr>
+        <p:style>
+          <a:lnRef idx="2">
+            <a:schemeClr val="accent1">
+              <a:shade val="50000"/>
+            </a:schemeClr>
+          </a:lnRef>
+          <a:fillRef idx="1">
+            <a:schemeClr val="accent1"/>
+          </a:fillRef>
+          <a:effectRef idx="0">
+            <a:schemeClr val="accent1"/>
+          </a:effectRef>
+          <a:fontRef idx="minor">
+            <a:schemeClr val="lt1"/>
+          </a:fontRef>
+        </p:style>
+        <p:txBody>
+          <a:bodyPr rtlCol="0" anchor="ctr"/>
+          <a:lstStyle/>
+          <a:p>
+            <a:pPr algn="ctr"/>
+            <a:endParaRPr lang="en-US" sz="1350"/>
           </a:p>
         </p:txBody>
       </p:sp>
@@ -13623,40 +14397,6 @@
       </p:grpSpPr>
       <p:sp>
         <p:nvSpPr>
-          <p:cNvPr id="49" name="TextBox 48"/>
-          <p:cNvSpPr txBox="1"/>
-          <p:nvPr/>
-        </p:nvSpPr>
-        <p:spPr>
-          <a:xfrm>
-            <a:off x="3396548" y="749253"/>
-            <a:ext cx="3101618" cy="369332"/>
-          </a:xfrm>
-          <a:prstGeom prst="rect">
-            <a:avLst/>
-          </a:prstGeom>
-          <a:noFill/>
-        </p:spPr>
-        <p:txBody>
-          <a:bodyPr wrap="none" rtlCol="0">
-            <a:spAutoFit/>
-          </a:bodyPr>
-          <a:lstStyle/>
-          <a:p>
-            <a:r>
-              <a:rPr lang="en-US" dirty="0"/>
-              <a:t>Extend </a:t>
-            </a:r>
-            <a:r>
-              <a:rPr lang="en-US" altLang="zh-CN" dirty="0" err="1" smtClean="0"/>
-              <a:t>aligned_wordhitsChunk</a:t>
-            </a:r>
-            <a:endParaRPr lang="en-US" dirty="0"/>
-          </a:p>
-        </p:txBody>
-      </p:sp>
-      <p:sp>
-        <p:nvSpPr>
           <p:cNvPr id="43" name="Rectangle 42"/>
           <p:cNvSpPr/>
           <p:nvPr/>
@@ -13697,6 +14437,123 @@
       </p:sp>
       <p:sp>
         <p:nvSpPr>
+          <p:cNvPr id="32" name="Rectangle 31"/>
+          <p:cNvSpPr/>
+          <p:nvPr/>
+        </p:nvSpPr>
+        <p:spPr>
+          <a:xfrm>
+            <a:off x="3642645" y="2202439"/>
+            <a:ext cx="2267986" cy="242024"/>
+          </a:xfrm>
+          <a:prstGeom prst="rect">
+            <a:avLst/>
+          </a:prstGeom>
+          <a:solidFill>
+            <a:schemeClr val="bg2">
+              <a:lumMod val="75000"/>
+            </a:schemeClr>
+          </a:solidFill>
+        </p:spPr>
+        <p:style>
+          <a:lnRef idx="2">
+            <a:schemeClr val="accent2">
+              <a:shade val="50000"/>
+            </a:schemeClr>
+          </a:lnRef>
+          <a:fillRef idx="1">
+            <a:schemeClr val="accent2"/>
+          </a:fillRef>
+          <a:effectRef idx="0">
+            <a:schemeClr val="accent2"/>
+          </a:effectRef>
+          <a:fontRef idx="minor">
+            <a:schemeClr val="lt1"/>
+          </a:fontRef>
+        </p:style>
+        <p:txBody>
+          <a:bodyPr rtlCol="0" anchor="ctr"/>
+          <a:lstStyle/>
+          <a:p>
+            <a:pPr algn="ctr"/>
+            <a:endParaRPr lang="en-US" sz="1350"/>
+          </a:p>
+        </p:txBody>
+      </p:sp>
+      <p:sp>
+        <p:nvSpPr>
+          <p:cNvPr id="21" name="Rectangle 20"/>
+          <p:cNvSpPr/>
+          <p:nvPr/>
+        </p:nvSpPr>
+        <p:spPr>
+          <a:xfrm>
+            <a:off x="3816037" y="2197878"/>
+            <a:ext cx="1852334" cy="268475"/>
+          </a:xfrm>
+          <a:prstGeom prst="rect">
+            <a:avLst/>
+          </a:prstGeom>
+        </p:spPr>
+        <p:style>
+          <a:lnRef idx="3">
+            <a:schemeClr val="lt1"/>
+          </a:lnRef>
+          <a:fillRef idx="1">
+            <a:schemeClr val="accent3"/>
+          </a:fillRef>
+          <a:effectRef idx="1">
+            <a:schemeClr val="accent3"/>
+          </a:effectRef>
+          <a:fontRef idx="minor">
+            <a:schemeClr val="lt1"/>
+          </a:fontRef>
+        </p:style>
+        <p:txBody>
+          <a:bodyPr rtlCol="0" anchor="ctr"/>
+          <a:lstStyle/>
+          <a:p>
+            <a:pPr algn="ctr"/>
+            <a:endParaRPr lang="en-US" sz="1350"/>
+          </a:p>
+        </p:txBody>
+      </p:sp>
+      <p:sp>
+        <p:nvSpPr>
+          <p:cNvPr id="49" name="TextBox 48"/>
+          <p:cNvSpPr txBox="1"/>
+          <p:nvPr/>
+        </p:nvSpPr>
+        <p:spPr>
+          <a:xfrm>
+            <a:off x="3396548" y="749253"/>
+            <a:ext cx="3101618" cy="369332"/>
+          </a:xfrm>
+          <a:prstGeom prst="rect">
+            <a:avLst/>
+          </a:prstGeom>
+          <a:noFill/>
+        </p:spPr>
+        <p:txBody>
+          <a:bodyPr wrap="none" rtlCol="0">
+            <a:spAutoFit/>
+          </a:bodyPr>
+          <a:lstStyle/>
+          <a:p>
+            <a:r>
+              <a:rPr lang="en-US" dirty="0"/>
+              <a:t>Extend </a:t>
+            </a:r>
+            <a:r>
+              <a:rPr lang="en-US" altLang="zh-CN" dirty="0" err="1" smtClean="0"/>
+              <a:t>aligned_wordhitsChunk</a:t>
+            </a:r>
+            <a:endParaRPr lang="en-US" dirty="0"/>
+          </a:p>
+        </p:txBody>
+      </p:sp>
+      <p:sp>
+        <p:nvSpPr>
           <p:cNvPr id="44" name="Rectangle 43"/>
           <p:cNvSpPr/>
           <p:nvPr/>
@@ -14011,106 +14868,6 @@
               <a:t>sides</a:t>
             </a:r>
             <a:endParaRPr lang="en-US" dirty="0"/>
-          </a:p>
-        </p:txBody>
-      </p:sp>
-      <p:sp>
-        <p:nvSpPr>
-          <p:cNvPr id="2" name="Rectangle 1"/>
-          <p:cNvSpPr/>
-          <p:nvPr/>
-        </p:nvSpPr>
-        <p:spPr>
-          <a:xfrm>
-            <a:off x="4130905" y="2199203"/>
-            <a:ext cx="1231901" cy="237744"/>
-          </a:xfrm>
-          <a:prstGeom prst="rect">
-            <a:avLst/>
-          </a:prstGeom>
-          <a:solidFill>
-            <a:schemeClr val="accent1">
-              <a:alpha val="20000"/>
-            </a:schemeClr>
-          </a:solidFill>
-          <a:ln w="63500">
-            <a:solidFill>
-              <a:schemeClr val="tx1"/>
-            </a:solidFill>
-          </a:ln>
-        </p:spPr>
-        <p:style>
-          <a:lnRef idx="2">
-            <a:schemeClr val="accent1">
-              <a:shade val="50000"/>
-            </a:schemeClr>
-          </a:lnRef>
-          <a:fillRef idx="1">
-            <a:schemeClr val="accent1"/>
-          </a:fillRef>
-          <a:effectRef idx="0">
-            <a:schemeClr val="accent1"/>
-          </a:effectRef>
-          <a:fontRef idx="minor">
-            <a:schemeClr val="lt1"/>
-          </a:fontRef>
-        </p:style>
-        <p:txBody>
-          <a:bodyPr rtlCol="0" anchor="ctr"/>
-          <a:lstStyle/>
-          <a:p>
-            <a:pPr algn="ctr"/>
-            <a:endParaRPr lang="en-US" sz="1350"/>
-          </a:p>
-        </p:txBody>
-      </p:sp>
-      <p:sp>
-        <p:nvSpPr>
-          <p:cNvPr id="25" name="Rectangle 24"/>
-          <p:cNvSpPr/>
-          <p:nvPr/>
-        </p:nvSpPr>
-        <p:spPr>
-          <a:xfrm>
-            <a:off x="2332282" y="3512819"/>
-            <a:ext cx="1504916" cy="237744"/>
-          </a:xfrm>
-          <a:prstGeom prst="rect">
-            <a:avLst/>
-          </a:prstGeom>
-          <a:solidFill>
-            <a:schemeClr val="accent1">
-              <a:alpha val="40000"/>
-            </a:schemeClr>
-          </a:solidFill>
-          <a:ln w="63500">
-            <a:solidFill>
-              <a:schemeClr val="tx1"/>
-            </a:solidFill>
-          </a:ln>
-        </p:spPr>
-        <p:style>
-          <a:lnRef idx="2">
-            <a:schemeClr val="accent1">
-              <a:shade val="50000"/>
-            </a:schemeClr>
-          </a:lnRef>
-          <a:fillRef idx="1">
-            <a:schemeClr val="accent1"/>
-          </a:fillRef>
-          <a:effectRef idx="0">
-            <a:schemeClr val="accent1"/>
-          </a:effectRef>
-          <a:fontRef idx="minor">
-            <a:schemeClr val="lt1"/>
-          </a:fontRef>
-        </p:style>
-        <p:txBody>
-          <a:bodyPr rtlCol="0" anchor="ctr"/>
-          <a:lstStyle/>
-          <a:p>
-            <a:pPr algn="ctr"/>
-            <a:endParaRPr lang="en-US" sz="1350"/>
           </a:p>
         </p:txBody>
       </p:sp>
@@ -14429,6 +15186,100 @@
               <a:t>wordhitsChunk</a:t>
             </a:r>
             <a:endParaRPr lang="en-US" dirty="0"/>
+          </a:p>
+        </p:txBody>
+      </p:sp>
+      <p:sp>
+        <p:nvSpPr>
+          <p:cNvPr id="26" name="Rectangle 25"/>
+          <p:cNvSpPr/>
+          <p:nvPr/>
+        </p:nvSpPr>
+        <p:spPr>
+          <a:xfrm>
+            <a:off x="4109744" y="2189189"/>
+            <a:ext cx="1264918" cy="277164"/>
+          </a:xfrm>
+          <a:prstGeom prst="rect">
+            <a:avLst/>
+          </a:prstGeom>
+          <a:solidFill>
+            <a:schemeClr val="accent4">
+              <a:lumMod val="40000"/>
+              <a:lumOff val="60000"/>
+              <a:alpha val="60000"/>
+            </a:schemeClr>
+          </a:solidFill>
+        </p:spPr>
+        <p:style>
+          <a:lnRef idx="2">
+            <a:schemeClr val="accent1">
+              <a:shade val="50000"/>
+            </a:schemeClr>
+          </a:lnRef>
+          <a:fillRef idx="1">
+            <a:schemeClr val="accent1"/>
+          </a:fillRef>
+          <a:effectRef idx="0">
+            <a:schemeClr val="accent1"/>
+          </a:effectRef>
+          <a:fontRef idx="minor">
+            <a:schemeClr val="lt1"/>
+          </a:fontRef>
+        </p:style>
+        <p:txBody>
+          <a:bodyPr rtlCol="0" anchor="ctr"/>
+          <a:lstStyle/>
+          <a:p>
+            <a:pPr algn="ctr"/>
+            <a:endParaRPr lang="en-US" sz="1350"/>
+          </a:p>
+        </p:txBody>
+      </p:sp>
+      <p:sp>
+        <p:nvSpPr>
+          <p:cNvPr id="27" name="Rectangle 26"/>
+          <p:cNvSpPr/>
+          <p:nvPr/>
+        </p:nvSpPr>
+        <p:spPr>
+          <a:xfrm>
+            <a:off x="2323991" y="3492440"/>
+            <a:ext cx="1513205" cy="256784"/>
+          </a:xfrm>
+          <a:prstGeom prst="rect">
+            <a:avLst/>
+          </a:prstGeom>
+          <a:solidFill>
+            <a:schemeClr val="accent4">
+              <a:lumMod val="40000"/>
+              <a:lumOff val="60000"/>
+              <a:alpha val="60000"/>
+            </a:schemeClr>
+          </a:solidFill>
+        </p:spPr>
+        <p:style>
+          <a:lnRef idx="2">
+            <a:schemeClr val="accent1">
+              <a:shade val="50000"/>
+            </a:schemeClr>
+          </a:lnRef>
+          <a:fillRef idx="1">
+            <a:schemeClr val="accent1"/>
+          </a:fillRef>
+          <a:effectRef idx="0">
+            <a:schemeClr val="accent1"/>
+          </a:effectRef>
+          <a:fontRef idx="minor">
+            <a:schemeClr val="lt1"/>
+          </a:fontRef>
+        </p:style>
+        <p:txBody>
+          <a:bodyPr rtlCol="0" anchor="ctr"/>
+          <a:lstStyle/>
+          <a:p>
+            <a:pPr algn="ctr"/>
+            <a:endParaRPr lang="en-US" sz="1350"/>
           </a:p>
         </p:txBody>
       </p:sp>
@@ -14725,6 +15576,12 @@
           <a:prstGeom prst="rect">
             <a:avLst/>
           </a:prstGeom>
+          <a:solidFill>
+            <a:schemeClr val="accent4">
+              <a:lumMod val="40000"/>
+              <a:lumOff val="60000"/>
+            </a:schemeClr>
+          </a:solidFill>
         </p:spPr>
         <p:style>
           <a:lnRef idx="2">
@@ -14748,18 +15605,34 @@
           <a:p>
             <a:pPr algn="ctr"/>
             <a:r>
-              <a:rPr lang="en-US" altLang="zh-CN" sz="1200" smtClean="0"/>
+              <a:rPr lang="en-US" altLang="zh-CN" sz="1200" dirty="0" err="1" smtClean="0">
+                <a:solidFill>
+                  <a:schemeClr val="tx1"/>
+                </a:solidFill>
+              </a:rPr>
               <a:t>wordhitsChunk</a:t>
             </a:r>
             <a:r>
-              <a:rPr lang="zh-CN" altLang="en-US" sz="1200" dirty="0" smtClean="0"/>
+              <a:rPr lang="zh-CN" altLang="en-US" sz="1200" dirty="0" smtClean="0">
+                <a:solidFill>
+                  <a:schemeClr val="tx1"/>
+                </a:solidFill>
+              </a:rPr>
               <a:t> </a:t>
             </a:r>
             <a:r>
-              <a:rPr lang="en-US" sz="1350" dirty="0" smtClean="0"/>
+              <a:rPr lang="en-US" sz="1350" dirty="0" smtClean="0">
+                <a:solidFill>
+                  <a:schemeClr val="tx1"/>
+                </a:solidFill>
+              </a:rPr>
               <a:t>1</a:t>
             </a:r>
-            <a:endParaRPr lang="en-US" sz="1350" dirty="0"/>
+            <a:endParaRPr lang="en-US" sz="1350" dirty="0">
+              <a:solidFill>
+                <a:schemeClr val="tx1"/>
+              </a:solidFill>
+            </a:endParaRPr>
           </a:p>
         </p:txBody>
       </p:sp>
@@ -14777,6 +15650,12 @@
           <a:prstGeom prst="rect">
             <a:avLst/>
           </a:prstGeom>
+          <a:solidFill>
+            <a:schemeClr val="accent4">
+              <a:lumMod val="40000"/>
+              <a:lumOff val="60000"/>
+            </a:schemeClr>
+          </a:solidFill>
         </p:spPr>
         <p:style>
           <a:lnRef idx="2">
@@ -14800,18 +15679,29 @@
           <a:p>
             <a:pPr algn="ctr"/>
             <a:r>
-              <a:rPr lang="en-US" altLang="zh-CN" sz="1400" smtClean="0"/>
+              <a:rPr lang="en-US" altLang="zh-CN" sz="1400" dirty="0" err="1">
+                <a:solidFill>
+                  <a:schemeClr val="tx1"/>
+                </a:solidFill>
+              </a:rPr>
               <a:t>wordhitsChunk</a:t>
             </a:r>
             <a:r>
-              <a:rPr lang="zh-CN" altLang="en-US" sz="1400" dirty="0" smtClean="0"/>
+              <a:rPr lang="zh-CN" altLang="en-US" sz="1400" dirty="0">
+                <a:solidFill>
+                  <a:schemeClr val="tx1"/>
+                </a:solidFill>
+              </a:rPr>
               <a:t> </a:t>
             </a:r>
             <a:r>
-              <a:rPr lang="en-US" sz="1350" dirty="0" smtClean="0"/>
+              <a:rPr lang="en-US" sz="1400" dirty="0">
+                <a:solidFill>
+                  <a:schemeClr val="tx1"/>
+                </a:solidFill>
+              </a:rPr>
               <a:t>3</a:t>
             </a:r>
-            <a:endParaRPr lang="en-US" sz="1350" dirty="0"/>
           </a:p>
         </p:txBody>
       </p:sp>
@@ -14829,6 +15719,12 @@
           <a:prstGeom prst="rect">
             <a:avLst/>
           </a:prstGeom>
+          <a:solidFill>
+            <a:schemeClr val="accent4">
+              <a:lumMod val="40000"/>
+              <a:lumOff val="60000"/>
+            </a:schemeClr>
+          </a:solidFill>
         </p:spPr>
         <p:style>
           <a:lnRef idx="2">
@@ -14852,18 +15748,34 @@
           <a:p>
             <a:pPr algn="ctr"/>
             <a:r>
-              <a:rPr lang="en-US" altLang="zh-CN" sz="1400" smtClean="0"/>
+              <a:rPr lang="en-US" altLang="zh-CN" sz="1400" dirty="0" err="1" smtClean="0">
+                <a:solidFill>
+                  <a:schemeClr val="tx1"/>
+                </a:solidFill>
+              </a:rPr>
               <a:t>wordhitsChunk</a:t>
             </a:r>
             <a:r>
-              <a:rPr lang="zh-CN" altLang="en-US" sz="1400" dirty="0" smtClean="0"/>
+              <a:rPr lang="zh-CN" altLang="en-US" sz="1400" dirty="0" smtClean="0">
+                <a:solidFill>
+                  <a:schemeClr val="tx1"/>
+                </a:solidFill>
+              </a:rPr>
               <a:t> </a:t>
             </a:r>
             <a:r>
-              <a:rPr lang="en-US" sz="1350" dirty="0" smtClean="0"/>
+              <a:rPr lang="en-US" sz="1350" dirty="0" smtClean="0">
+                <a:solidFill>
+                  <a:schemeClr val="tx1"/>
+                </a:solidFill>
+              </a:rPr>
               <a:t>4</a:t>
             </a:r>
-            <a:endParaRPr lang="en-US" sz="1350" dirty="0"/>
+            <a:endParaRPr lang="en-US" sz="1350" dirty="0">
+              <a:solidFill>
+                <a:schemeClr val="tx1"/>
+              </a:solidFill>
+            </a:endParaRPr>
           </a:p>
         </p:txBody>
       </p:sp>
@@ -15055,6 +15967,12 @@
           <a:prstGeom prst="rect">
             <a:avLst/>
           </a:prstGeom>
+          <a:solidFill>
+            <a:schemeClr val="accent4">
+              <a:lumMod val="40000"/>
+              <a:lumOff val="60000"/>
+            </a:schemeClr>
+          </a:solidFill>
         </p:spPr>
         <p:style>
           <a:lnRef idx="2">
@@ -15078,22 +15996,42 @@
           <a:p>
             <a:pPr algn="ctr"/>
             <a:r>
-              <a:rPr lang="en-US" altLang="zh-CN" sz="1200" dirty="0" err="1" smtClean="0"/>
+              <a:rPr lang="en-US" altLang="zh-CN" sz="1200" dirty="0" err="1" smtClean="0">
+                <a:solidFill>
+                  <a:schemeClr val="tx1"/>
+                </a:solidFill>
+              </a:rPr>
               <a:t>wordhitsChunk</a:t>
             </a:r>
             <a:r>
-              <a:rPr lang="zh-CN" altLang="en-US" sz="1200" dirty="0" smtClean="0"/>
+              <a:rPr lang="zh-CN" altLang="en-US" sz="1200" dirty="0" smtClean="0">
+                <a:solidFill>
+                  <a:schemeClr val="tx1"/>
+                </a:solidFill>
+              </a:rPr>
               <a:t> </a:t>
             </a:r>
             <a:r>
-              <a:rPr lang="en-US" altLang="zh-CN" sz="1200" dirty="0" smtClean="0"/>
+              <a:rPr lang="en-US" altLang="zh-CN" sz="1200" dirty="0" smtClean="0">
+                <a:solidFill>
+                  <a:schemeClr val="tx1"/>
+                </a:solidFill>
+              </a:rPr>
               <a:t>1</a:t>
             </a:r>
             <a:r>
-              <a:rPr lang="zh-CN" altLang="en-US" sz="1200" dirty="0" smtClean="0"/>
+              <a:rPr lang="zh-CN" altLang="en-US" sz="1200" dirty="0" smtClean="0">
+                <a:solidFill>
+                  <a:schemeClr val="tx1"/>
+                </a:solidFill>
+              </a:rPr>
               <a:t> </a:t>
             </a:r>
-            <a:endParaRPr lang="en-US" sz="1350" dirty="0"/>
+            <a:endParaRPr lang="en-US" sz="1350" dirty="0">
+              <a:solidFill>
+                <a:schemeClr val="tx1"/>
+              </a:solidFill>
+            </a:endParaRPr>
           </a:p>
         </p:txBody>
       </p:sp>
@@ -15111,6 +16049,12 @@
           <a:prstGeom prst="rect">
             <a:avLst/>
           </a:prstGeom>
+          <a:solidFill>
+            <a:schemeClr val="accent4">
+              <a:lumMod val="40000"/>
+              <a:lumOff val="60000"/>
+            </a:schemeClr>
+          </a:solidFill>
         </p:spPr>
         <p:style>
           <a:lnRef idx="2">
@@ -15134,22 +16078,42 @@
           <a:p>
             <a:pPr algn="ctr"/>
             <a:r>
-              <a:rPr lang="en-US" altLang="zh-CN" sz="1200" dirty="0" err="1" smtClean="0"/>
+              <a:rPr lang="en-US" altLang="zh-CN" sz="1200" dirty="0" err="1" smtClean="0">
+                <a:solidFill>
+                  <a:schemeClr val="tx1"/>
+                </a:solidFill>
+              </a:rPr>
               <a:t>wordhitsChunk</a:t>
             </a:r>
             <a:r>
-              <a:rPr lang="zh-CN" altLang="en-US" sz="1200" dirty="0" smtClean="0"/>
+              <a:rPr lang="zh-CN" altLang="en-US" sz="1200" dirty="0" smtClean="0">
+                <a:solidFill>
+                  <a:schemeClr val="tx1"/>
+                </a:solidFill>
+              </a:rPr>
               <a:t> </a:t>
             </a:r>
             <a:r>
-              <a:rPr lang="en-US" altLang="zh-CN" sz="1200" dirty="0" smtClean="0"/>
+              <a:rPr lang="en-US" altLang="zh-CN" sz="1200" dirty="0" smtClean="0">
+                <a:solidFill>
+                  <a:schemeClr val="tx1"/>
+                </a:solidFill>
+              </a:rPr>
               <a:t>2</a:t>
             </a:r>
             <a:r>
-              <a:rPr lang="zh-CN" altLang="en-US" sz="1200" dirty="0" smtClean="0"/>
+              <a:rPr lang="zh-CN" altLang="en-US" sz="1200" dirty="0" smtClean="0">
+                <a:solidFill>
+                  <a:schemeClr val="tx1"/>
+                </a:solidFill>
+              </a:rPr>
               <a:t> </a:t>
             </a:r>
-            <a:endParaRPr lang="en-US" sz="1350" dirty="0"/>
+            <a:endParaRPr lang="en-US" sz="1350" dirty="0">
+              <a:solidFill>
+                <a:schemeClr val="tx1"/>
+              </a:solidFill>
+            </a:endParaRPr>
           </a:p>
         </p:txBody>
       </p:sp>

</xml_diff>